<commit_message>
03 - writing slides, tweak to startup.cs
</commit_message>
<xml_diff>
--- a/03/03.pptx
+++ b/03/03.pptx
@@ -6,28 +6,34 @@
     <p:sldMasterId id="2147483684" r:id="rId2"/>
   </p:sldMasterIdLst>
   <p:notesMasterIdLst>
-    <p:notesMasterId r:id="rId19"/>
+    <p:notesMasterId r:id="rId25"/>
   </p:notesMasterIdLst>
   <p:handoutMasterIdLst>
-    <p:handoutMasterId r:id="rId20"/>
+    <p:handoutMasterId r:id="rId26"/>
   </p:handoutMasterIdLst>
   <p:sldIdLst>
     <p:sldId id="444" r:id="rId3"/>
     <p:sldId id="445" r:id="rId4"/>
     <p:sldId id="496" r:id="rId5"/>
-    <p:sldId id="494" r:id="rId6"/>
-    <p:sldId id="500" r:id="rId7"/>
-    <p:sldId id="503" r:id="rId8"/>
-    <p:sldId id="504" r:id="rId9"/>
-    <p:sldId id="506" r:id="rId10"/>
-    <p:sldId id="505" r:id="rId11"/>
-    <p:sldId id="508" r:id="rId12"/>
-    <p:sldId id="507" r:id="rId13"/>
-    <p:sldId id="509" r:id="rId14"/>
-    <p:sldId id="498" r:id="rId15"/>
-    <p:sldId id="502" r:id="rId16"/>
-    <p:sldId id="501" r:id="rId17"/>
-    <p:sldId id="484" r:id="rId18"/>
+    <p:sldId id="503" r:id="rId6"/>
+    <p:sldId id="504" r:id="rId7"/>
+    <p:sldId id="506" r:id="rId8"/>
+    <p:sldId id="505" r:id="rId9"/>
+    <p:sldId id="508" r:id="rId10"/>
+    <p:sldId id="507" r:id="rId11"/>
+    <p:sldId id="509" r:id="rId12"/>
+    <p:sldId id="512" r:id="rId13"/>
+    <p:sldId id="513" r:id="rId14"/>
+    <p:sldId id="515" r:id="rId15"/>
+    <p:sldId id="514" r:id="rId16"/>
+    <p:sldId id="516" r:id="rId17"/>
+    <p:sldId id="517" r:id="rId18"/>
+    <p:sldId id="484" r:id="rId19"/>
+    <p:sldId id="510" r:id="rId20"/>
+    <p:sldId id="518" r:id="rId21"/>
+    <p:sldId id="519" r:id="rId22"/>
+    <p:sldId id="520" r:id="rId23"/>
+    <p:sldId id="511" r:id="rId24"/>
   </p:sldIdLst>
   <p:sldSz cx="9144000" cy="5143500" type="screen16x9"/>
   <p:notesSz cx="6858000" cy="9144000"/>
@@ -134,8 +140,6 @@
             <p14:sldId id="444"/>
             <p14:sldId id="445"/>
             <p14:sldId id="496"/>
-            <p14:sldId id="494"/>
-            <p14:sldId id="500"/>
             <p14:sldId id="503"/>
             <p14:sldId id="504"/>
             <p14:sldId id="506"/>
@@ -143,10 +147,18 @@
             <p14:sldId id="508"/>
             <p14:sldId id="507"/>
             <p14:sldId id="509"/>
-            <p14:sldId id="498"/>
-            <p14:sldId id="502"/>
-            <p14:sldId id="501"/>
+            <p14:sldId id="512"/>
+            <p14:sldId id="513"/>
+            <p14:sldId id="515"/>
+            <p14:sldId id="514"/>
+            <p14:sldId id="516"/>
+            <p14:sldId id="517"/>
             <p14:sldId id="484"/>
+            <p14:sldId id="510"/>
+            <p14:sldId id="518"/>
+            <p14:sldId id="519"/>
+            <p14:sldId id="520"/>
+            <p14:sldId id="511"/>
           </p14:sldIdLst>
         </p14:section>
       </p14:sectionLst>
@@ -824,7 +836,7 @@
           <a:p>
             <a:fld id="{F39351FC-18D6-4741-8EEB-9FDB1F020AAC}" type="slidenum">
               <a:rPr lang="en-US" smtClean="0"/>
-              <a:t>6</a:t>
+              <a:t>4</a:t>
             </a:fld>
             <a:endParaRPr lang="en-US"/>
           </a:p>
@@ -834,6 +846,289 @@
     <p:extLst>
       <p:ext uri="{BB962C8B-B14F-4D97-AF65-F5344CB8AC3E}">
         <p14:creationId xmlns:p14="http://schemas.microsoft.com/office/powerpoint/2010/main" val="1755348127"/>
+      </p:ext>
+    </p:extLst>
+  </p:cSld>
+  <p:clrMapOvr>
+    <a:masterClrMapping/>
+  </p:clrMapOvr>
+</p:notes>
+</file>
+
+<file path=ppt/notesSlides/notesSlide10.xml><?xml version="1.0" encoding="utf-8"?>
+<p:notes xmlns:a="http://schemas.openxmlformats.org/drawingml/2006/main" xmlns:r="http://schemas.openxmlformats.org/officeDocument/2006/relationships" xmlns:p="http://schemas.openxmlformats.org/presentationml/2006/main">
+  <p:cSld>
+    <p:spTree>
+      <p:nvGrpSpPr>
+        <p:cNvPr id="1" name=""/>
+        <p:cNvGrpSpPr/>
+        <p:nvPr/>
+      </p:nvGrpSpPr>
+      <p:grpSpPr>
+        <a:xfrm>
+          <a:off x="0" y="0"/>
+          <a:ext cx="0" cy="0"/>
+          <a:chOff x="0" y="0"/>
+          <a:chExt cx="0" cy="0"/>
+        </a:xfrm>
+      </p:grpSpPr>
+      <p:sp>
+        <p:nvSpPr>
+          <p:cNvPr id="2" name="Slide Image Placeholder 1"/>
+          <p:cNvSpPr>
+            <a:spLocks noGrp="1" noRot="1" noChangeAspect="1"/>
+          </p:cNvSpPr>
+          <p:nvPr>
+            <p:ph type="sldImg"/>
+          </p:nvPr>
+        </p:nvSpPr>
+        <p:spPr/>
+      </p:sp>
+      <p:sp>
+        <p:nvSpPr>
+          <p:cNvPr id="3" name="Notes Placeholder 2"/>
+          <p:cNvSpPr>
+            <a:spLocks noGrp="1"/>
+          </p:cNvSpPr>
+          <p:nvPr>
+            <p:ph type="body" idx="1"/>
+          </p:nvPr>
+        </p:nvSpPr>
+        <p:spPr/>
+        <p:txBody>
+          <a:bodyPr/>
+          <a:lstStyle/>
+          <a:p>
+            <a:r>
+              <a:rPr lang="en-US" dirty="0"/>
+              <a:t>I got a little bleary-eyed at this part, so I hope I'm wrong, but I don't think I am</a:t>
+            </a:r>
+          </a:p>
+          <a:p>
+            <a:endParaRPr lang="en-US" dirty="0"/>
+          </a:p>
+          <a:p>
+            <a:r>
+              <a:rPr lang="en-US" dirty="0"/>
+              <a:t>There may be more global options for </a:t>
+            </a:r>
+            <a:r>
+              <a:rPr lang="en-US" dirty="0" err="1"/>
+              <a:t>PascalCasing</a:t>
+            </a:r>
+            <a:r>
+              <a:rPr lang="en-US" dirty="0"/>
+              <a:t> </a:t>
+            </a:r>
+            <a:r>
+              <a:rPr lang="en-US" dirty="0" err="1"/>
+              <a:t>en</a:t>
+            </a:r>
+            <a:r>
+              <a:rPr lang="en-US" dirty="0"/>
+              <a:t> masse, not needed for this workshop</a:t>
+            </a:r>
+          </a:p>
+        </p:txBody>
+      </p:sp>
+      <p:sp>
+        <p:nvSpPr>
+          <p:cNvPr id="4" name="Slide Number Placeholder 3"/>
+          <p:cNvSpPr>
+            <a:spLocks noGrp="1"/>
+          </p:cNvSpPr>
+          <p:nvPr>
+            <p:ph type="sldNum" sz="quarter" idx="10"/>
+          </p:nvPr>
+        </p:nvSpPr>
+        <p:spPr/>
+        <p:txBody>
+          <a:bodyPr/>
+          <a:lstStyle/>
+          <a:p>
+            <a:fld id="{F39351FC-18D6-4741-8EEB-9FDB1F020AAC}" type="slidenum">
+              <a:rPr lang="en-US" smtClean="0"/>
+              <a:t>16</a:t>
+            </a:fld>
+            <a:endParaRPr lang="en-US"/>
+          </a:p>
+        </p:txBody>
+      </p:sp>
+    </p:spTree>
+    <p:extLst>
+      <p:ext uri="{BB962C8B-B14F-4D97-AF65-F5344CB8AC3E}">
+        <p14:creationId xmlns:p14="http://schemas.microsoft.com/office/powerpoint/2010/main" val="3179598985"/>
+      </p:ext>
+    </p:extLst>
+  </p:cSld>
+  <p:clrMapOvr>
+    <a:masterClrMapping/>
+  </p:clrMapOvr>
+</p:notes>
+</file>
+
+<file path=ppt/notesSlides/notesSlide11.xml><?xml version="1.0" encoding="utf-8"?>
+<p:notes xmlns:a="http://schemas.openxmlformats.org/drawingml/2006/main" xmlns:r="http://schemas.openxmlformats.org/officeDocument/2006/relationships" xmlns:p="http://schemas.openxmlformats.org/presentationml/2006/main">
+  <p:cSld>
+    <p:spTree>
+      <p:nvGrpSpPr>
+        <p:cNvPr id="1" name=""/>
+        <p:cNvGrpSpPr/>
+        <p:nvPr/>
+      </p:nvGrpSpPr>
+      <p:grpSpPr>
+        <a:xfrm>
+          <a:off x="0" y="0"/>
+          <a:ext cx="0" cy="0"/>
+          <a:chOff x="0" y="0"/>
+          <a:chExt cx="0" cy="0"/>
+        </a:xfrm>
+      </p:grpSpPr>
+      <p:sp>
+        <p:nvSpPr>
+          <p:cNvPr id="2" name="Slide Image Placeholder 1"/>
+          <p:cNvSpPr>
+            <a:spLocks noGrp="1" noRot="1" noChangeAspect="1"/>
+          </p:cNvSpPr>
+          <p:nvPr>
+            <p:ph type="sldImg"/>
+          </p:nvPr>
+        </p:nvSpPr>
+        <p:spPr/>
+      </p:sp>
+      <p:sp>
+        <p:nvSpPr>
+          <p:cNvPr id="3" name="Notes Placeholder 2"/>
+          <p:cNvSpPr>
+            <a:spLocks noGrp="1"/>
+          </p:cNvSpPr>
+          <p:nvPr>
+            <p:ph type="body" idx="1"/>
+          </p:nvPr>
+        </p:nvSpPr>
+        <p:spPr/>
+        <p:txBody>
+          <a:bodyPr/>
+          <a:lstStyle/>
+          <a:p>
+            <a:r>
+              <a:rPr lang="en-US" dirty="0"/>
+              <a:t>If all else fails, you can test with your browser</a:t>
+            </a:r>
+          </a:p>
+        </p:txBody>
+      </p:sp>
+      <p:sp>
+        <p:nvSpPr>
+          <p:cNvPr id="4" name="Slide Number Placeholder 3"/>
+          <p:cNvSpPr>
+            <a:spLocks noGrp="1"/>
+          </p:cNvSpPr>
+          <p:nvPr>
+            <p:ph type="sldNum" sz="quarter" idx="10"/>
+          </p:nvPr>
+        </p:nvSpPr>
+        <p:spPr/>
+        <p:txBody>
+          <a:bodyPr/>
+          <a:lstStyle/>
+          <a:p>
+            <a:fld id="{F39351FC-18D6-4741-8EEB-9FDB1F020AAC}" type="slidenum">
+              <a:rPr lang="en-US" smtClean="0"/>
+              <a:t>18</a:t>
+            </a:fld>
+            <a:endParaRPr lang="en-US"/>
+          </a:p>
+        </p:txBody>
+      </p:sp>
+    </p:spTree>
+    <p:extLst>
+      <p:ext uri="{BB962C8B-B14F-4D97-AF65-F5344CB8AC3E}">
+        <p14:creationId xmlns:p14="http://schemas.microsoft.com/office/powerpoint/2010/main" val="2491276630"/>
+      </p:ext>
+    </p:extLst>
+  </p:cSld>
+  <p:clrMapOvr>
+    <a:masterClrMapping/>
+  </p:clrMapOvr>
+</p:notes>
+</file>
+
+<file path=ppt/notesSlides/notesSlide12.xml><?xml version="1.0" encoding="utf-8"?>
+<p:notes xmlns:a="http://schemas.openxmlformats.org/drawingml/2006/main" xmlns:r="http://schemas.openxmlformats.org/officeDocument/2006/relationships" xmlns:p="http://schemas.openxmlformats.org/presentationml/2006/main">
+  <p:cSld>
+    <p:spTree>
+      <p:nvGrpSpPr>
+        <p:cNvPr id="1" name=""/>
+        <p:cNvGrpSpPr/>
+        <p:nvPr/>
+      </p:nvGrpSpPr>
+      <p:grpSpPr>
+        <a:xfrm>
+          <a:off x="0" y="0"/>
+          <a:ext cx="0" cy="0"/>
+          <a:chOff x="0" y="0"/>
+          <a:chExt cx="0" cy="0"/>
+        </a:xfrm>
+      </p:grpSpPr>
+      <p:sp>
+        <p:nvSpPr>
+          <p:cNvPr id="2" name="Slide Image Placeholder 1"/>
+          <p:cNvSpPr>
+            <a:spLocks noGrp="1" noRot="1" noChangeAspect="1"/>
+          </p:cNvSpPr>
+          <p:nvPr>
+            <p:ph type="sldImg"/>
+          </p:nvPr>
+        </p:nvSpPr>
+        <p:spPr/>
+      </p:sp>
+      <p:sp>
+        <p:nvSpPr>
+          <p:cNvPr id="3" name="Notes Placeholder 2"/>
+          <p:cNvSpPr>
+            <a:spLocks noGrp="1"/>
+          </p:cNvSpPr>
+          <p:nvPr>
+            <p:ph type="body" idx="1"/>
+          </p:nvPr>
+        </p:nvSpPr>
+        <p:spPr/>
+        <p:txBody>
+          <a:bodyPr/>
+          <a:lstStyle/>
+          <a:p>
+            <a:endParaRPr lang="en-US" baseline="0" dirty="0"/>
+          </a:p>
+        </p:txBody>
+      </p:sp>
+      <p:sp>
+        <p:nvSpPr>
+          <p:cNvPr id="4" name="Slide Number Placeholder 3"/>
+          <p:cNvSpPr>
+            <a:spLocks noGrp="1"/>
+          </p:cNvSpPr>
+          <p:nvPr>
+            <p:ph type="sldNum" sz="quarter" idx="10"/>
+          </p:nvPr>
+        </p:nvSpPr>
+        <p:spPr/>
+        <p:txBody>
+          <a:bodyPr/>
+          <a:lstStyle/>
+          <a:p>
+            <a:fld id="{F39351FC-18D6-4741-8EEB-9FDB1F020AAC}" type="slidenum">
+              <a:rPr lang="en-US" smtClean="0"/>
+              <a:t>21</a:t>
+            </a:fld>
+            <a:endParaRPr lang="en-US"/>
+          </a:p>
+        </p:txBody>
+      </p:sp>
+    </p:spTree>
+    <p:extLst>
+      <p:ext uri="{BB962C8B-B14F-4D97-AF65-F5344CB8AC3E}">
+        <p14:creationId xmlns:p14="http://schemas.microsoft.com/office/powerpoint/2010/main" val="3201661572"/>
       </p:ext>
     </p:extLst>
   </p:cSld>
@@ -923,7 +1218,7 @@
           <a:p>
             <a:fld id="{F39351FC-18D6-4741-8EEB-9FDB1F020AAC}" type="slidenum">
               <a:rPr lang="en-US" smtClean="0"/>
-              <a:t>7</a:t>
+              <a:t>5</a:t>
             </a:fld>
             <a:endParaRPr lang="en-US"/>
           </a:p>
@@ -1021,7 +1316,7 @@
           <a:p>
             <a:fld id="{F39351FC-18D6-4741-8EEB-9FDB1F020AAC}" type="slidenum">
               <a:rPr lang="en-US" smtClean="0"/>
-              <a:t>8</a:t>
+              <a:t>6</a:t>
             </a:fld>
             <a:endParaRPr lang="en-US"/>
           </a:p>
@@ -1210,7 +1505,7 @@
           <a:p>
             <a:fld id="{F39351FC-18D6-4741-8EEB-9FDB1F020AAC}" type="slidenum">
               <a:rPr lang="en-US" smtClean="0"/>
-              <a:t>9</a:t>
+              <a:t>7</a:t>
             </a:fld>
             <a:endParaRPr lang="en-US"/>
           </a:p>
@@ -1318,7 +1613,7 @@
           <a:p>
             <a:fld id="{F39351FC-18D6-4741-8EEB-9FDB1F020AAC}" type="slidenum">
               <a:rPr lang="en-US" smtClean="0"/>
-              <a:t>10</a:t>
+              <a:t>8</a:t>
             </a:fld>
             <a:endParaRPr lang="en-US"/>
           </a:p>
@@ -1400,7 +1695,7 @@
           <a:p>
             <a:r>
               <a:rPr lang="en-US" dirty="0"/>
-              <a:t>If you've not used MVC before, then you are in for a treat. You may struggle a bit with this workshop</a:t>
+              <a:t>If you've not used MVC you may struggle a bit with this workshop</a:t>
             </a:r>
           </a:p>
           <a:p>
@@ -1467,7 +1762,7 @@
           <a:p>
             <a:fld id="{F39351FC-18D6-4741-8EEB-9FDB1F020AAC}" type="slidenum">
               <a:rPr lang="en-US" smtClean="0"/>
-              <a:t>11</a:t>
+              <a:t>9</a:t>
             </a:fld>
             <a:endParaRPr lang="en-US"/>
           </a:p>
@@ -1532,17 +1827,25 @@
           <a:p>
             <a:r>
               <a:rPr lang="en-US" dirty="0"/>
-              <a:t>We</a:t>
-            </a:r>
-            <a:r>
-              <a:rPr lang="en-US" baseline="0" dirty="0"/>
-              <a:t> started this workshop a while ago, but we haven’t been keeping up with Angular, so you might get an error message if you don’t use 1.0.0-beta.10</a:t>
-            </a:r>
-          </a:p>
-          <a:p>
-            <a:r>
-              <a:rPr lang="en-US" baseline="0" dirty="0"/>
-              <a:t>Then kick off the angular server with ng serve</a:t>
+              <a:t>In this workshop, CORS is turned off. This is because Angular will be running on one port, the backend on another. This will be a CORS violation and the browser will error.</a:t>
+            </a:r>
+          </a:p>
+          <a:p>
+            <a:endParaRPr lang="en-US" dirty="0"/>
+          </a:p>
+          <a:p>
+            <a:r>
+              <a:rPr lang="en-US" dirty="0"/>
+              <a:t>You can ultimately deploy them on the same port, but sometimes you don't want that.</a:t>
+            </a:r>
+          </a:p>
+          <a:p>
+            <a:endParaRPr lang="en-US" dirty="0"/>
+          </a:p>
+          <a:p>
+            <a:r>
+              <a:rPr lang="en-US" dirty="0"/>
+              <a:t>In both these examples, I'm allowing cross-domain requests from anywhere, for anything. That may be fine, but it may not be what you want.</a:t>
             </a:r>
           </a:p>
         </p:txBody>
@@ -1564,7 +1867,7 @@
           <a:p>
             <a:fld id="{F39351FC-18D6-4741-8EEB-9FDB1F020AAC}" type="slidenum">
               <a:rPr lang="en-US" smtClean="0"/>
-              <a:t>15</a:t>
+              <a:t>12</a:t>
             </a:fld>
             <a:endParaRPr lang="en-US"/>
           </a:p>
@@ -1573,7 +1876,300 @@
     </p:spTree>
     <p:extLst>
       <p:ext uri="{BB962C8B-B14F-4D97-AF65-F5344CB8AC3E}">
-        <p14:creationId xmlns:p14="http://schemas.microsoft.com/office/powerpoint/2010/main" val="1659110175"/>
+        <p14:creationId xmlns:p14="http://schemas.microsoft.com/office/powerpoint/2010/main" val="1460629473"/>
+      </p:ext>
+    </p:extLst>
+  </p:cSld>
+  <p:clrMapOvr>
+    <a:masterClrMapping/>
+  </p:clrMapOvr>
+</p:notes>
+</file>
+
+<file path=ppt/notesSlides/notesSlide8.xml><?xml version="1.0" encoding="utf-8"?>
+<p:notes xmlns:a="http://schemas.openxmlformats.org/drawingml/2006/main" xmlns:r="http://schemas.openxmlformats.org/officeDocument/2006/relationships" xmlns:p="http://schemas.openxmlformats.org/presentationml/2006/main">
+  <p:cSld>
+    <p:spTree>
+      <p:nvGrpSpPr>
+        <p:cNvPr id="1" name=""/>
+        <p:cNvGrpSpPr/>
+        <p:nvPr/>
+      </p:nvGrpSpPr>
+      <p:grpSpPr>
+        <a:xfrm>
+          <a:off x="0" y="0"/>
+          <a:ext cx="0" cy="0"/>
+          <a:chOff x="0" y="0"/>
+          <a:chExt cx="0" cy="0"/>
+        </a:xfrm>
+      </p:grpSpPr>
+      <p:sp>
+        <p:nvSpPr>
+          <p:cNvPr id="2" name="Slide Image Placeholder 1"/>
+          <p:cNvSpPr>
+            <a:spLocks noGrp="1" noRot="1" noChangeAspect="1"/>
+          </p:cNvSpPr>
+          <p:nvPr>
+            <p:ph type="sldImg"/>
+          </p:nvPr>
+        </p:nvSpPr>
+        <p:spPr/>
+      </p:sp>
+      <p:sp>
+        <p:nvSpPr>
+          <p:cNvPr id="3" name="Notes Placeholder 2"/>
+          <p:cNvSpPr>
+            <a:spLocks noGrp="1"/>
+          </p:cNvSpPr>
+          <p:nvPr>
+            <p:ph type="body" idx="1"/>
+          </p:nvPr>
+        </p:nvSpPr>
+        <p:spPr/>
+        <p:txBody>
+          <a:bodyPr/>
+          <a:lstStyle/>
+          <a:p>
+            <a:r>
+              <a:rPr lang="en-US" dirty="0"/>
+              <a:t>Application start is where you can setup route configuration, register </a:t>
+            </a:r>
+            <a:r>
+              <a:rPr lang="en-US" dirty="0" err="1"/>
+              <a:t>WebAPI</a:t>
+            </a:r>
+            <a:r>
+              <a:rPr lang="en-US" dirty="0"/>
+              <a:t>, filters, </a:t>
+            </a:r>
+            <a:r>
+              <a:rPr lang="en-US" dirty="0" err="1"/>
+              <a:t>etc</a:t>
+            </a:r>
+            <a:endParaRPr lang="en-US" dirty="0"/>
+          </a:p>
+          <a:p>
+            <a:endParaRPr lang="en-US" dirty="0"/>
+          </a:p>
+          <a:p>
+            <a:r>
+              <a:rPr lang="en-US" dirty="0"/>
+              <a:t>ASP.NET Core is basically a console application. But you aren't going to typically mess with </a:t>
+            </a:r>
+            <a:r>
+              <a:rPr lang="en-US" dirty="0" err="1"/>
+              <a:t>Program.cs</a:t>
+            </a:r>
+            <a:r>
+              <a:rPr lang="en-US" dirty="0"/>
+              <a:t>, certainly not in this workshop</a:t>
+            </a:r>
+          </a:p>
+          <a:p>
+            <a:r>
+              <a:rPr lang="en-US" dirty="0"/>
+              <a:t>Startup class is used by the </a:t>
+            </a:r>
+            <a:r>
+              <a:rPr lang="en-US" dirty="0" err="1"/>
+              <a:t>WebHostBuilder</a:t>
+            </a:r>
+            <a:r>
+              <a:rPr lang="en-US" dirty="0"/>
+              <a:t> in </a:t>
+            </a:r>
+            <a:r>
+              <a:rPr lang="en-US" dirty="0" err="1"/>
+              <a:t>Program.cs</a:t>
+            </a:r>
+            <a:r>
+              <a:rPr lang="en-US" dirty="0"/>
+              <a:t>, this is where </a:t>
+            </a:r>
+            <a:r>
+              <a:rPr lang="en-US" dirty="0" err="1"/>
+              <a:t>you'lll</a:t>
+            </a:r>
+            <a:r>
+              <a:rPr lang="en-US" dirty="0"/>
+              <a:t> do the application startup</a:t>
+            </a:r>
+          </a:p>
+        </p:txBody>
+      </p:sp>
+      <p:sp>
+        <p:nvSpPr>
+          <p:cNvPr id="4" name="Slide Number Placeholder 3"/>
+          <p:cNvSpPr>
+            <a:spLocks noGrp="1"/>
+          </p:cNvSpPr>
+          <p:nvPr>
+            <p:ph type="sldNum" sz="quarter" idx="10"/>
+          </p:nvPr>
+        </p:nvSpPr>
+        <p:spPr/>
+        <p:txBody>
+          <a:bodyPr/>
+          <a:lstStyle/>
+          <a:p>
+            <a:fld id="{F39351FC-18D6-4741-8EEB-9FDB1F020AAC}" type="slidenum">
+              <a:rPr lang="en-US" smtClean="0"/>
+              <a:t>13</a:t>
+            </a:fld>
+            <a:endParaRPr lang="en-US"/>
+          </a:p>
+        </p:txBody>
+      </p:sp>
+    </p:spTree>
+    <p:extLst>
+      <p:ext uri="{BB962C8B-B14F-4D97-AF65-F5344CB8AC3E}">
+        <p14:creationId xmlns:p14="http://schemas.microsoft.com/office/powerpoint/2010/main" val="3330441528"/>
+      </p:ext>
+    </p:extLst>
+  </p:cSld>
+  <p:clrMapOvr>
+    <a:masterClrMapping/>
+  </p:clrMapOvr>
+</p:notes>
+</file>
+
+<file path=ppt/notesSlides/notesSlide9.xml><?xml version="1.0" encoding="utf-8"?>
+<p:notes xmlns:a="http://schemas.openxmlformats.org/drawingml/2006/main" xmlns:r="http://schemas.openxmlformats.org/officeDocument/2006/relationships" xmlns:p="http://schemas.openxmlformats.org/presentationml/2006/main">
+  <p:cSld>
+    <p:spTree>
+      <p:nvGrpSpPr>
+        <p:cNvPr id="1" name=""/>
+        <p:cNvGrpSpPr/>
+        <p:nvPr/>
+      </p:nvGrpSpPr>
+      <p:grpSpPr>
+        <a:xfrm>
+          <a:off x="0" y="0"/>
+          <a:ext cx="0" cy="0"/>
+          <a:chOff x="0" y="0"/>
+          <a:chExt cx="0" cy="0"/>
+        </a:xfrm>
+      </p:grpSpPr>
+      <p:sp>
+        <p:nvSpPr>
+          <p:cNvPr id="2" name="Slide Image Placeholder 1"/>
+          <p:cNvSpPr>
+            <a:spLocks noGrp="1" noRot="1" noChangeAspect="1"/>
+          </p:cNvSpPr>
+          <p:nvPr>
+            <p:ph type="sldImg"/>
+          </p:nvPr>
+        </p:nvSpPr>
+        <p:spPr/>
+      </p:sp>
+      <p:sp>
+        <p:nvSpPr>
+          <p:cNvPr id="3" name="Notes Placeholder 2"/>
+          <p:cNvSpPr>
+            <a:spLocks noGrp="1"/>
+          </p:cNvSpPr>
+          <p:nvPr>
+            <p:ph type="body" idx="1"/>
+          </p:nvPr>
+        </p:nvSpPr>
+        <p:spPr/>
+        <p:txBody>
+          <a:bodyPr/>
+          <a:lstStyle/>
+          <a:p>
+            <a:r>
+              <a:rPr lang="en-US" dirty="0"/>
+              <a:t>ASP.NET uses the famous </a:t>
+            </a:r>
+            <a:r>
+              <a:rPr lang="en-US" dirty="0" err="1"/>
+              <a:t>web.config</a:t>
+            </a:r>
+            <a:r>
+              <a:rPr lang="en-US" dirty="0"/>
+              <a:t>, you can access it with </a:t>
+            </a:r>
+            <a:r>
+              <a:rPr lang="en-US" dirty="0" err="1"/>
+              <a:t>ConfigurationManager</a:t>
+            </a:r>
+            <a:r>
+              <a:rPr lang="en-US" dirty="0"/>
+              <a:t> API</a:t>
+            </a:r>
+          </a:p>
+          <a:p>
+            <a:endParaRPr lang="en-US" dirty="0"/>
+          </a:p>
+          <a:p>
+            <a:r>
+              <a:rPr lang="en-US" dirty="0"/>
+              <a:t>ASP.NET core uses a JSON file called </a:t>
+            </a:r>
+            <a:r>
+              <a:rPr lang="en-US" dirty="0" err="1"/>
+              <a:t>appsettings.json</a:t>
+            </a:r>
+            <a:r>
+              <a:rPr lang="en-US" dirty="0"/>
+              <a:t> (you can call it whatever you want actually, it's not magical like </a:t>
+            </a:r>
+            <a:r>
+              <a:rPr lang="en-US" dirty="0" err="1"/>
+              <a:t>Web.config</a:t>
+            </a:r>
+            <a:r>
+              <a:rPr lang="en-US" dirty="0"/>
+              <a:t>)</a:t>
+            </a:r>
+          </a:p>
+          <a:p>
+            <a:r>
+              <a:rPr lang="en-US" dirty="0"/>
+              <a:t>There's an API for  accessing it and sections of it</a:t>
+            </a:r>
+          </a:p>
+          <a:p>
+            <a:r>
+              <a:rPr lang="en-US" dirty="0"/>
+              <a:t>It can be bound to C# objects</a:t>
+            </a:r>
+          </a:p>
+          <a:p>
+            <a:r>
+              <a:rPr lang="en-US" dirty="0"/>
+              <a:t>And it can be configured as a service to use in constructor injection</a:t>
+            </a:r>
+          </a:p>
+        </p:txBody>
+      </p:sp>
+      <p:sp>
+        <p:nvSpPr>
+          <p:cNvPr id="4" name="Slide Number Placeholder 3"/>
+          <p:cNvSpPr>
+            <a:spLocks noGrp="1"/>
+          </p:cNvSpPr>
+          <p:nvPr>
+            <p:ph type="sldNum" sz="quarter" idx="10"/>
+          </p:nvPr>
+        </p:nvSpPr>
+        <p:spPr/>
+        <p:txBody>
+          <a:bodyPr/>
+          <a:lstStyle/>
+          <a:p>
+            <a:fld id="{F39351FC-18D6-4741-8EEB-9FDB1F020AAC}" type="slidenum">
+              <a:rPr lang="en-US" smtClean="0"/>
+              <a:t>14</a:t>
+            </a:fld>
+            <a:endParaRPr lang="en-US"/>
+          </a:p>
+        </p:txBody>
+      </p:sp>
+    </p:spTree>
+    <p:extLst>
+      <p:ext uri="{BB962C8B-B14F-4D97-AF65-F5344CB8AC3E}">
+        <p14:creationId xmlns:p14="http://schemas.microsoft.com/office/powerpoint/2010/main" val="739114377"/>
       </p:ext>
     </p:extLst>
   </p:cSld>
@@ -7426,7 +8022,7 @@
           <a:p>
             <a:r>
               <a:rPr lang="en-US" sz="3600" dirty="0"/>
-              <a:t>Workshop C – Building a Full-stack Application</a:t>
+              <a:t>Workshop C – Building a RESTful API</a:t>
             </a:r>
           </a:p>
         </p:txBody>
@@ -7497,39 +8093,148 @@
           <a:p>
             <a:r>
               <a:rPr lang="en-US" dirty="0"/>
-              <a:t>ASP.NET vs ASP.NET Core</a:t>
-            </a:r>
+              <a:t>ASP.NET </a:t>
+            </a:r>
+            <a:r>
+              <a:rPr lang="en-US" dirty="0" err="1"/>
+              <a:t>WebAPI</a:t>
+            </a:r>
+            <a:r>
+              <a:rPr lang="en-US" dirty="0"/>
+              <a:t> vs ASP.NET Core </a:t>
+            </a:r>
+            <a:r>
+              <a:rPr lang="en-US" dirty="0" err="1"/>
+              <a:t>WebAPI</a:t>
+            </a:r>
+            <a:endParaRPr lang="en-US" dirty="0"/>
           </a:p>
         </p:txBody>
       </p:sp>
-      <p:pic>
-        <p:nvPicPr>
-          <p:cNvPr id="4" name="Picture 3"/>
-          <p:cNvPicPr>
-            <a:picLocks noChangeAspect="1"/>
-          </p:cNvPicPr>
-          <p:nvPr/>
-        </p:nvPicPr>
-        <p:blipFill>
-          <a:blip r:embed="rId3"/>
-          <a:stretch>
-            <a:fillRect/>
-          </a:stretch>
-        </p:blipFill>
-        <p:spPr>
-          <a:xfrm>
-            <a:off x="416615" y="1200064"/>
-            <a:ext cx="8307587" cy="2400386"/>
-          </a:xfrm>
-          <a:prstGeom prst="rect">
-            <a:avLst/>
-          </a:prstGeom>
-        </p:spPr>
-      </p:pic>
+      <p:sp>
+        <p:nvSpPr>
+          <p:cNvPr id="3" name="Content Placeholder 2"/>
+          <p:cNvSpPr>
+            <a:spLocks noGrp="1"/>
+          </p:cNvSpPr>
+          <p:nvPr>
+            <p:ph idx="1"/>
+          </p:nvPr>
+        </p:nvSpPr>
+        <p:spPr/>
+        <p:txBody>
+          <a:bodyPr/>
+          <a:lstStyle/>
+          <a:p>
+            <a:pPr marL="342900" indent="-342900">
+              <a:buFont typeface="Arial" panose="020B0604020202020204" pitchFamily="34" charset="0"/>
+              <a:buChar char="•"/>
+            </a:pPr>
+            <a:r>
+              <a:rPr lang="en-US" dirty="0" err="1"/>
+              <a:t>WebAPI</a:t>
+            </a:r>
+            <a:r>
+              <a:rPr lang="en-US" dirty="0"/>
+              <a:t>/MVC convergence</a:t>
+            </a:r>
+          </a:p>
+          <a:p>
+            <a:pPr marL="342900" indent="-342900">
+              <a:buFont typeface="Arial" panose="020B0604020202020204" pitchFamily="34" charset="0"/>
+              <a:buChar char="•"/>
+            </a:pPr>
+            <a:endParaRPr lang="en-US" dirty="0"/>
+          </a:p>
+          <a:p>
+            <a:pPr marL="342900" indent="-342900">
+              <a:buFont typeface="Arial" panose="020B0604020202020204" pitchFamily="34" charset="0"/>
+              <a:buChar char="•"/>
+            </a:pPr>
+            <a:r>
+              <a:rPr lang="en-US" dirty="0"/>
+              <a:t>CORS</a:t>
+            </a:r>
+          </a:p>
+          <a:p>
+            <a:pPr marL="342900" indent="-342900">
+              <a:buFont typeface="Arial" panose="020B0604020202020204" pitchFamily="34" charset="0"/>
+              <a:buChar char="•"/>
+            </a:pPr>
+            <a:endParaRPr lang="en-US" dirty="0"/>
+          </a:p>
+          <a:p>
+            <a:pPr marL="342900" indent="-342900">
+              <a:buFont typeface="Arial" panose="020B0604020202020204" pitchFamily="34" charset="0"/>
+              <a:buChar char="•"/>
+            </a:pPr>
+            <a:r>
+              <a:rPr lang="en-US" dirty="0"/>
+              <a:t>Configuration</a:t>
+            </a:r>
+          </a:p>
+          <a:p>
+            <a:pPr marL="342900" indent="-342900">
+              <a:buFont typeface="Arial" panose="020B0604020202020204" pitchFamily="34" charset="0"/>
+              <a:buChar char="•"/>
+            </a:pPr>
+            <a:endParaRPr lang="en-US" dirty="0"/>
+          </a:p>
+          <a:p>
+            <a:pPr marL="342900" indent="-342900">
+              <a:buFont typeface="Arial" panose="020B0604020202020204" pitchFamily="34" charset="0"/>
+              <a:buChar char="•"/>
+            </a:pPr>
+            <a:r>
+              <a:rPr lang="en-US" dirty="0"/>
+              <a:t>Startup</a:t>
+            </a:r>
+          </a:p>
+          <a:p>
+            <a:pPr marL="342900" indent="-342900">
+              <a:buFont typeface="Arial" panose="020B0604020202020204" pitchFamily="34" charset="0"/>
+              <a:buChar char="•"/>
+            </a:pPr>
+            <a:endParaRPr lang="en-US" dirty="0"/>
+          </a:p>
+          <a:p>
+            <a:pPr marL="342900" indent="-342900">
+              <a:buFont typeface="Arial" panose="020B0604020202020204" pitchFamily="34" charset="0"/>
+              <a:buChar char="•"/>
+            </a:pPr>
+            <a:r>
+              <a:rPr lang="en-US" dirty="0"/>
+              <a:t>Static files</a:t>
+            </a:r>
+          </a:p>
+          <a:p>
+            <a:pPr marL="342900" indent="-342900">
+              <a:buFont typeface="Arial" panose="020B0604020202020204" pitchFamily="34" charset="0"/>
+              <a:buChar char="•"/>
+            </a:pPr>
+            <a:endParaRPr lang="en-US" dirty="0"/>
+          </a:p>
+          <a:p>
+            <a:pPr marL="342900" indent="-342900">
+              <a:buFont typeface="Arial" panose="020B0604020202020204" pitchFamily="34" charset="0"/>
+              <a:buChar char="•"/>
+            </a:pPr>
+            <a:r>
+              <a:rPr lang="en-US" dirty="0"/>
+              <a:t>Casing / </a:t>
+            </a:r>
+            <a:r>
+              <a:rPr lang="en-US" dirty="0" err="1"/>
+              <a:t>JsonProperty</a:t>
+            </a:r>
+            <a:endParaRPr lang="en-US" dirty="0"/>
+          </a:p>
+        </p:txBody>
+      </p:sp>
     </p:spTree>
     <p:extLst>
       <p:ext uri="{BB962C8B-B14F-4D97-AF65-F5344CB8AC3E}">
-        <p14:creationId xmlns:p14="http://schemas.microsoft.com/office/powerpoint/2010/main" val="2466830981"/>
+        <p14:creationId xmlns:p14="http://schemas.microsoft.com/office/powerpoint/2010/main" val="1455635530"/>
       </p:ext>
     </p:extLst>
   </p:cSld>
@@ -7572,10 +8277,17 @@
           <a:lstStyle/>
           <a:p>
             <a:r>
+              <a:rPr lang="en-US" dirty="0"/>
+              <a:t>Core </a:t>
+            </a:r>
+            <a:r>
               <a:rPr lang="en-US" dirty="0" err="1"/>
               <a:t>WebAPI</a:t>
             </a:r>
-            <a:endParaRPr lang="en-US" dirty="0"/>
+            <a:r>
+              <a:rPr lang="en-US" dirty="0"/>
+              <a:t> Convergence	</a:t>
+            </a:r>
           </a:p>
         </p:txBody>
       </p:sp>
@@ -7600,7 +8312,15 @@
             </a:pPr>
             <a:r>
               <a:rPr lang="en-US" dirty="0"/>
-              <a:t>There are a lot of similarities between ASP.NET and ASP.NET Core</a:t>
+              <a:t>In ASP.NET Core, MVC and </a:t>
+            </a:r>
+            <a:r>
+              <a:rPr lang="en-US" dirty="0" err="1"/>
+              <a:t>WebAPI</a:t>
+            </a:r>
+            <a:r>
+              <a:rPr lang="en-US" dirty="0"/>
+              <a:t> converge</a:t>
             </a:r>
           </a:p>
           <a:p>
@@ -7617,92 +8337,61 @@
             </a:pPr>
             <a:r>
               <a:rPr lang="en-US" dirty="0"/>
-              <a:t>Similar to MVC:</a:t>
-            </a:r>
-          </a:p>
-          <a:p>
-            <a:pPr marL="573088" lvl="1" indent="-342900">
-              <a:buFont typeface="Arial" panose="020B0604020202020204" pitchFamily="34" charset="0"/>
-              <a:buChar char="•"/>
-            </a:pPr>
-            <a:r>
-              <a:rPr lang="en-US" sz="2000" dirty="0"/>
-              <a:t>Controllers: classes that inherit from a special base class</a:t>
-            </a:r>
-          </a:p>
-          <a:p>
-            <a:pPr marL="573088" lvl="3" indent="-342900">
-              <a:buFont typeface="Arial" panose="020B0604020202020204" pitchFamily="34" charset="0"/>
-              <a:buChar char="•"/>
-            </a:pPr>
-            <a:r>
-              <a:rPr lang="en-US" dirty="0"/>
-              <a:t>ASP.NET – </a:t>
+              <a:t>Instead of Controller and </a:t>
             </a:r>
             <a:r>
               <a:rPr lang="en-US" dirty="0" err="1"/>
               <a:t>ApiController</a:t>
             </a:r>
-            <a:endParaRPr lang="en-US" dirty="0"/>
-          </a:p>
-          <a:p>
-            <a:pPr marL="573088" lvl="3" indent="-342900">
-              <a:buFont typeface="Arial" panose="020B0604020202020204" pitchFamily="34" charset="0"/>
-              <a:buChar char="•"/>
-            </a:pPr>
-            <a:r>
-              <a:rPr lang="en-US" dirty="0"/>
-              <a:t>ASP.NET Core – Controller</a:t>
-            </a:r>
-          </a:p>
-          <a:p>
-            <a:pPr marL="2857500" lvl="5" indent="-342900">
+            <a:r>
+              <a:rPr lang="en-US" dirty="0"/>
+              <a:t>, there is just Controller</a:t>
+            </a:r>
+          </a:p>
+          <a:p>
+            <a:pPr marL="342900" indent="-342900">
               <a:buFont typeface="Arial" panose="020B0604020202020204" pitchFamily="34" charset="0"/>
               <a:buChar char="•"/>
             </a:pPr>
             <a:endParaRPr lang="en-US" dirty="0"/>
           </a:p>
           <a:p>
-            <a:pPr marL="573088" lvl="1" indent="-342900">
+            <a:pPr marL="342900" indent="-342900">
               <a:buFont typeface="Arial" panose="020B0604020202020204" pitchFamily="34" charset="0"/>
               <a:buChar char="•"/>
             </a:pPr>
             <a:r>
-              <a:rPr lang="en-US" sz="2000" dirty="0"/>
-              <a:t>Methods: endpoints</a:t>
-            </a:r>
-          </a:p>
-          <a:p>
-            <a:pPr marL="573088" lvl="1" indent="-342900">
-              <a:buFont typeface="Arial" panose="020B0604020202020204" pitchFamily="34" charset="0"/>
-              <a:buChar char="•"/>
-            </a:pPr>
-            <a:endParaRPr lang="en-US" sz="2000" dirty="0"/>
-          </a:p>
-          <a:p>
-            <a:pPr marL="573088" lvl="1" indent="-342900">
-              <a:buFont typeface="Arial" panose="020B0604020202020204" pitchFamily="34" charset="0"/>
-              <a:buChar char="•"/>
-            </a:pPr>
-            <a:r>
-              <a:rPr lang="en-US" sz="2000" dirty="0"/>
-              <a:t>Optional </a:t>
-            </a:r>
-            <a:r>
-              <a:rPr lang="en-US" sz="2000" dirty="0" err="1"/>
-              <a:t>async</a:t>
-            </a:r>
-            <a:r>
-              <a:rPr lang="en-US" sz="2000" dirty="0"/>
-              <a:t>/await</a:t>
-            </a:r>
+              <a:rPr lang="en-US" dirty="0"/>
+              <a:t>Instead of </a:t>
+            </a:r>
+            <a:r>
+              <a:rPr lang="en-US" dirty="0" err="1"/>
+              <a:t>IHttpActionResult</a:t>
+            </a:r>
+            <a:r>
+              <a:rPr lang="en-US" dirty="0"/>
+              <a:t> (</a:t>
+            </a:r>
+            <a:r>
+              <a:rPr lang="en-US" dirty="0" err="1"/>
+              <a:t>WebAPI</a:t>
+            </a:r>
+            <a:r>
+              <a:rPr lang="en-US" dirty="0"/>
+              <a:t>) there is just </a:t>
+            </a:r>
+            <a:r>
+              <a:rPr lang="en-US" dirty="0" err="1"/>
+              <a:t>IActionResult</a:t>
+            </a:r>
+            <a:endParaRPr lang="en-US" dirty="0"/>
           </a:p>
         </p:txBody>
       </p:sp>
     </p:spTree>
     <p:extLst>
       <p:ext uri="{BB962C8B-B14F-4D97-AF65-F5344CB8AC3E}">
-        <p14:creationId xmlns:p14="http://schemas.microsoft.com/office/powerpoint/2010/main" val="1294541063"/>
+        <p14:creationId xmlns:p14="http://schemas.microsoft.com/office/powerpoint/2010/main" val="3506008056"/>
       </p:ext>
     </p:extLst>
   </p:cSld>
@@ -7746,21 +8435,8 @@
           <a:p>
             <a:r>
               <a:rPr lang="en-US" dirty="0"/>
-              <a:t>ASP.NET </a:t>
-            </a:r>
-            <a:r>
-              <a:rPr lang="en-US" dirty="0" err="1"/>
-              <a:t>WebAPI</a:t>
-            </a:r>
-            <a:r>
-              <a:rPr lang="en-US" dirty="0"/>
-              <a:t> vs ASP.NET Core </a:t>
-            </a:r>
-            <a:r>
-              <a:rPr lang="en-US" dirty="0" err="1"/>
-              <a:t>WebAPI</a:t>
-            </a:r>
-            <a:endParaRPr lang="en-US" dirty="0"/>
+              <a:t>CORS</a:t>
+            </a:r>
           </a:p>
         </p:txBody>
       </p:sp>
@@ -7784,28 +8460,16 @@
               <a:buChar char="•"/>
             </a:pPr>
             <a:r>
-              <a:rPr lang="en-US" dirty="0" err="1"/>
-              <a:t>IHttpActionResult</a:t>
-            </a:r>
-            <a:r>
-              <a:rPr lang="en-US" dirty="0"/>
-              <a:t> vs </a:t>
-            </a:r>
-            <a:r>
-              <a:rPr lang="en-US" dirty="0" err="1"/>
-              <a:t>IActionResult</a:t>
-            </a:r>
-            <a:endParaRPr lang="en-US" dirty="0"/>
+              <a:rPr lang="en-US" dirty="0"/>
+              <a:t>Cross-Origin Resource Sharing</a:t>
+            </a:r>
           </a:p>
           <a:p>
             <a:pPr marL="342900" indent="-342900">
               <a:buFont typeface="Arial" panose="020B0604020202020204" pitchFamily="34" charset="0"/>
               <a:buChar char="•"/>
             </a:pPr>
-            <a:r>
-              <a:rPr lang="en-US" dirty="0"/>
-              <a:t>CORS attribute</a:t>
-            </a:r>
+            <a:endParaRPr lang="en-US" dirty="0"/>
           </a:p>
           <a:p>
             <a:pPr marL="342900" indent="-342900">
@@ -7814,26 +8478,102 @@
             </a:pPr>
             <a:r>
               <a:rPr lang="en-US" dirty="0"/>
-              <a:t>CORS policy</a:t>
-            </a:r>
+              <a:t>ASP.NET</a:t>
+            </a:r>
+          </a:p>
+          <a:p>
+            <a:pPr marL="573088" lvl="1" indent="-342900">
+              <a:buFont typeface="Arial" panose="020B0604020202020204" pitchFamily="34" charset="0"/>
+              <a:buChar char="•"/>
+            </a:pPr>
+            <a:r>
+              <a:rPr lang="en-US" dirty="0">
+                <a:solidFill>
+                  <a:srgbClr val="000000"/>
+                </a:solidFill>
+                <a:latin typeface="Consolas" panose="020B0609020204030204" pitchFamily="49" charset="0"/>
+              </a:rPr>
+              <a:t>[</a:t>
+            </a:r>
+            <a:r>
+              <a:rPr lang="en-US" dirty="0" err="1">
+                <a:solidFill>
+                  <a:srgbClr val="2B91AF"/>
+                </a:solidFill>
+                <a:latin typeface="Consolas" panose="020B0609020204030204" pitchFamily="49" charset="0"/>
+              </a:rPr>
+              <a:t>EnableCors</a:t>
+            </a:r>
+            <a:r>
+              <a:rPr lang="en-US" dirty="0">
+                <a:solidFill>
+                  <a:srgbClr val="000000"/>
+                </a:solidFill>
+                <a:latin typeface="Consolas" panose="020B0609020204030204" pitchFamily="49" charset="0"/>
+              </a:rPr>
+              <a:t>(origins: </a:t>
+            </a:r>
+            <a:r>
+              <a:rPr lang="en-US" dirty="0">
+                <a:solidFill>
+                  <a:srgbClr val="A31515"/>
+                </a:solidFill>
+                <a:latin typeface="Consolas" panose="020B0609020204030204" pitchFamily="49" charset="0"/>
+              </a:rPr>
+              <a:t>"*"</a:t>
+            </a:r>
+            <a:r>
+              <a:rPr lang="en-US" dirty="0">
+                <a:solidFill>
+                  <a:srgbClr val="000000"/>
+                </a:solidFill>
+                <a:latin typeface="Consolas" panose="020B0609020204030204" pitchFamily="49" charset="0"/>
+              </a:rPr>
+              <a:t>, headers: </a:t>
+            </a:r>
+            <a:r>
+              <a:rPr lang="en-US" dirty="0">
+                <a:solidFill>
+                  <a:srgbClr val="A31515"/>
+                </a:solidFill>
+                <a:latin typeface="Consolas" panose="020B0609020204030204" pitchFamily="49" charset="0"/>
+              </a:rPr>
+              <a:t>"*"</a:t>
+            </a:r>
+            <a:r>
+              <a:rPr lang="en-US" dirty="0">
+                <a:solidFill>
+                  <a:srgbClr val="000000"/>
+                </a:solidFill>
+                <a:latin typeface="Consolas" panose="020B0609020204030204" pitchFamily="49" charset="0"/>
+              </a:rPr>
+              <a:t>, methods: </a:t>
+            </a:r>
+            <a:r>
+              <a:rPr lang="en-US" dirty="0">
+                <a:solidFill>
+                  <a:srgbClr val="A31515"/>
+                </a:solidFill>
+                <a:latin typeface="Consolas" panose="020B0609020204030204" pitchFamily="49" charset="0"/>
+              </a:rPr>
+              <a:t>"*"</a:t>
+            </a:r>
+            <a:r>
+              <a:rPr lang="en-US" dirty="0">
+                <a:solidFill>
+                  <a:srgbClr val="000000"/>
+                </a:solidFill>
+                <a:latin typeface="Consolas" panose="020B0609020204030204" pitchFamily="49" charset="0"/>
+              </a:rPr>
+              <a:t>)]</a:t>
+            </a:r>
+            <a:endParaRPr lang="en-US" dirty="0"/>
           </a:p>
           <a:p>
             <a:pPr marL="342900" indent="-342900">
               <a:buFont typeface="Arial" panose="020B0604020202020204" pitchFamily="34" charset="0"/>
               <a:buChar char="•"/>
             </a:pPr>
-            <a:r>
-              <a:rPr lang="en-US" dirty="0" err="1"/>
-              <a:t>Web.config</a:t>
-            </a:r>
-            <a:r>
-              <a:rPr lang="en-US" dirty="0"/>
-              <a:t> vs </a:t>
-            </a:r>
-            <a:r>
-              <a:rPr lang="en-US"/>
-              <a:t>appsettings.json</a:t>
-            </a:r>
             <a:endParaRPr lang="en-US" dirty="0"/>
           </a:p>
           <a:p>
@@ -7842,20 +8582,128 @@
               <a:buChar char="•"/>
             </a:pPr>
             <a:r>
-              <a:rPr lang="en-US" dirty="0" err="1"/>
-              <a:t>Global.asax</a:t>
-            </a:r>
-            <a:r>
-              <a:rPr lang="en-US" dirty="0"/>
-              <a:t> vs Startup</a:t>
-            </a:r>
+              <a:rPr lang="en-US" dirty="0"/>
+              <a:t>ASP.NET Core</a:t>
+            </a:r>
+          </a:p>
+          <a:p>
+            <a:pPr marL="573088" lvl="1" indent="-342900">
+              <a:buFont typeface="Arial" panose="020B0604020202020204" pitchFamily="34" charset="0"/>
+              <a:buChar char="•"/>
+            </a:pPr>
+            <a:r>
+              <a:rPr lang="en-US" dirty="0" err="1">
+                <a:solidFill>
+                  <a:srgbClr val="000000"/>
+                </a:solidFill>
+                <a:latin typeface="Consolas" panose="020B0609020204030204" pitchFamily="49" charset="0"/>
+              </a:rPr>
+              <a:t>app.UseCors</a:t>
+            </a:r>
+            <a:r>
+              <a:rPr lang="en-US" dirty="0">
+                <a:solidFill>
+                  <a:srgbClr val="000000"/>
+                </a:solidFill>
+                <a:latin typeface="Consolas" panose="020B0609020204030204" pitchFamily="49" charset="0"/>
+              </a:rPr>
+              <a:t>(builder =&gt; builder</a:t>
+            </a:r>
+          </a:p>
+          <a:p>
+            <a:r>
+              <a:rPr lang="en-US" dirty="0">
+                <a:solidFill>
+                  <a:srgbClr val="000000"/>
+                </a:solidFill>
+                <a:latin typeface="Consolas" panose="020B0609020204030204" pitchFamily="49" charset="0"/>
+              </a:rPr>
+              <a:t>                .</a:t>
+            </a:r>
+            <a:r>
+              <a:rPr lang="en-US" dirty="0" err="1">
+                <a:solidFill>
+                  <a:srgbClr val="000000"/>
+                </a:solidFill>
+                <a:latin typeface="Consolas" panose="020B0609020204030204" pitchFamily="49" charset="0"/>
+              </a:rPr>
+              <a:t>AllowAnyHeader</a:t>
+            </a:r>
+            <a:r>
+              <a:rPr lang="en-US" dirty="0">
+                <a:solidFill>
+                  <a:srgbClr val="000000"/>
+                </a:solidFill>
+                <a:latin typeface="Consolas" panose="020B0609020204030204" pitchFamily="49" charset="0"/>
+              </a:rPr>
+              <a:t>()</a:t>
+            </a:r>
+          </a:p>
+          <a:p>
+            <a:r>
+              <a:rPr lang="en-US" dirty="0">
+                <a:solidFill>
+                  <a:srgbClr val="000000"/>
+                </a:solidFill>
+                <a:latin typeface="Consolas" panose="020B0609020204030204" pitchFamily="49" charset="0"/>
+              </a:rPr>
+              <a:t>                .</a:t>
+            </a:r>
+            <a:r>
+              <a:rPr lang="en-US" dirty="0" err="1">
+                <a:solidFill>
+                  <a:srgbClr val="000000"/>
+                </a:solidFill>
+                <a:latin typeface="Consolas" panose="020B0609020204030204" pitchFamily="49" charset="0"/>
+              </a:rPr>
+              <a:t>AllowAnyMethod</a:t>
+            </a:r>
+            <a:r>
+              <a:rPr lang="en-US" dirty="0">
+                <a:solidFill>
+                  <a:srgbClr val="000000"/>
+                </a:solidFill>
+                <a:latin typeface="Consolas" panose="020B0609020204030204" pitchFamily="49" charset="0"/>
+              </a:rPr>
+              <a:t>()</a:t>
+            </a:r>
+          </a:p>
+          <a:p>
+            <a:r>
+              <a:rPr lang="en-US" dirty="0">
+                <a:solidFill>
+                  <a:srgbClr val="000000"/>
+                </a:solidFill>
+                <a:latin typeface="Consolas" panose="020B0609020204030204" pitchFamily="49" charset="0"/>
+              </a:rPr>
+              <a:t>                .</a:t>
+            </a:r>
+            <a:r>
+              <a:rPr lang="en-US" dirty="0" err="1">
+                <a:solidFill>
+                  <a:srgbClr val="000000"/>
+                </a:solidFill>
+                <a:latin typeface="Consolas" panose="020B0609020204030204" pitchFamily="49" charset="0"/>
+              </a:rPr>
+              <a:t>AllowAnyOrigin</a:t>
+            </a:r>
+            <a:r>
+              <a:rPr lang="en-US" dirty="0">
+                <a:solidFill>
+                  <a:srgbClr val="000000"/>
+                </a:solidFill>
+                <a:latin typeface="Consolas" panose="020B0609020204030204" pitchFamily="49" charset="0"/>
+              </a:rPr>
+              <a:t>());</a:t>
+            </a:r>
+            <a:endParaRPr lang="en-US" dirty="0"/>
           </a:p>
         </p:txBody>
       </p:sp>
     </p:spTree>
     <p:extLst>
       <p:ext uri="{BB962C8B-B14F-4D97-AF65-F5344CB8AC3E}">
-        <p14:creationId xmlns:p14="http://schemas.microsoft.com/office/powerpoint/2010/main" val="1455635530"/>
+        <p14:creationId xmlns:p14="http://schemas.microsoft.com/office/powerpoint/2010/main" val="3362038002"/>
       </p:ext>
     </p:extLst>
   </p:cSld>
@@ -7899,7 +8747,7 @@
           <a:p>
             <a:r>
               <a:rPr lang="en-US" dirty="0"/>
-              <a:t>ASP.NET</a:t>
+              <a:t>Startup</a:t>
             </a:r>
           </a:p>
         </p:txBody>
@@ -7914,7 +8762,12 @@
             <p:ph idx="1"/>
           </p:nvPr>
         </p:nvSpPr>
-        <p:spPr/>
+        <p:spPr>
+          <a:xfrm>
+            <a:off x="457200" y="685800"/>
+            <a:ext cx="8591550" cy="3394472"/>
+          </a:xfrm>
+        </p:spPr>
         <p:txBody>
           <a:bodyPr/>
           <a:lstStyle/>
@@ -7925,25 +8778,110 @@
             </a:pPr>
             <a:r>
               <a:rPr lang="en-US" dirty="0"/>
-              <a:t>Look for TODOs</a:t>
-            </a:r>
-          </a:p>
-          <a:p>
-            <a:pPr marL="342900" indent="-342900">
+              <a:t>ASP.NET</a:t>
+            </a:r>
+          </a:p>
+          <a:p>
+            <a:pPr marL="573088" lvl="1" indent="-342900">
               <a:buFont typeface="Arial" panose="020B0604020202020204" pitchFamily="34" charset="0"/>
               <a:buChar char="•"/>
             </a:pPr>
+            <a:r>
+              <a:rPr lang="en-US" dirty="0" err="1"/>
+              <a:t>Global.asax.cs</a:t>
+            </a:r>
             <a:endParaRPr lang="en-US" dirty="0"/>
           </a:p>
           <a:p>
-            <a:pPr marL="342900" indent="-342900">
+            <a:pPr marL="573088" lvl="1" indent="-342900">
               <a:buFont typeface="Arial" panose="020B0604020202020204" pitchFamily="34" charset="0"/>
               <a:buChar char="•"/>
             </a:pPr>
             <a:r>
-              <a:rPr lang="en-US" dirty="0"/>
-              <a:t>Files included:</a:t>
-            </a:r>
+              <a:rPr lang="en-US" dirty="0" err="1">
+                <a:solidFill>
+                  <a:srgbClr val="000000"/>
+                </a:solidFill>
+                <a:latin typeface="Consolas" panose="020B0609020204030204" pitchFamily="49" charset="0"/>
+              </a:rPr>
+              <a:t>System.Web.</a:t>
+            </a:r>
+            <a:r>
+              <a:rPr lang="en-US" dirty="0" err="1">
+                <a:solidFill>
+                  <a:srgbClr val="2B91AF"/>
+                </a:solidFill>
+                <a:latin typeface="Consolas" panose="020B0609020204030204" pitchFamily="49" charset="0"/>
+              </a:rPr>
+              <a:t>HttpApplication</a:t>
+            </a:r>
+            <a:endParaRPr lang="en-US" dirty="0">
+              <a:solidFill>
+                <a:srgbClr val="2B91AF"/>
+              </a:solidFill>
+              <a:latin typeface="Consolas" panose="020B0609020204030204" pitchFamily="49" charset="0"/>
+            </a:endParaRPr>
+          </a:p>
+          <a:p>
+            <a:pPr marL="573088" lvl="1" indent="-342900">
+              <a:buFont typeface="Arial" panose="020B0604020202020204" pitchFamily="34" charset="0"/>
+              <a:buChar char="•"/>
+            </a:pPr>
+            <a:r>
+              <a:rPr lang="en-US" dirty="0">
+                <a:solidFill>
+                  <a:srgbClr val="0000FF"/>
+                </a:solidFill>
+                <a:latin typeface="Consolas" panose="020B0609020204030204" pitchFamily="49" charset="0"/>
+              </a:rPr>
+              <a:t>protected</a:t>
+            </a:r>
+            <a:r>
+              <a:rPr lang="en-US" dirty="0">
+                <a:solidFill>
+                  <a:srgbClr val="000000"/>
+                </a:solidFill>
+                <a:latin typeface="Consolas" panose="020B0609020204030204" pitchFamily="49" charset="0"/>
+              </a:rPr>
+              <a:t> </a:t>
+            </a:r>
+            <a:r>
+              <a:rPr lang="en-US" dirty="0">
+                <a:solidFill>
+                  <a:srgbClr val="0000FF"/>
+                </a:solidFill>
+                <a:latin typeface="Consolas" panose="020B0609020204030204" pitchFamily="49" charset="0"/>
+              </a:rPr>
+              <a:t>void</a:t>
+            </a:r>
+            <a:r>
+              <a:rPr lang="en-US" dirty="0">
+                <a:solidFill>
+                  <a:srgbClr val="000000"/>
+                </a:solidFill>
+                <a:latin typeface="Consolas" panose="020B0609020204030204" pitchFamily="49" charset="0"/>
+              </a:rPr>
+              <a:t> </a:t>
+            </a:r>
+            <a:r>
+              <a:rPr lang="en-US" dirty="0" err="1">
+                <a:solidFill>
+                  <a:srgbClr val="000000"/>
+                </a:solidFill>
+                <a:latin typeface="Consolas" panose="020B0609020204030204" pitchFamily="49" charset="0"/>
+              </a:rPr>
+              <a:t>Application_Start</a:t>
+            </a:r>
+            <a:r>
+              <a:rPr lang="en-US" dirty="0">
+                <a:solidFill>
+                  <a:srgbClr val="000000"/>
+                </a:solidFill>
+                <a:latin typeface="Consolas" panose="020B0609020204030204" pitchFamily="49" charset="0"/>
+              </a:rPr>
+              <a:t>()</a:t>
+            </a:r>
+            <a:endParaRPr lang="en-US" dirty="0"/>
           </a:p>
           <a:p>
             <a:pPr marL="573088" lvl="1" indent="-342900">
@@ -7953,10 +8891,264 @@
             <a:endParaRPr lang="en-US" dirty="0"/>
           </a:p>
           <a:p>
+            <a:pPr marL="573088" lvl="1" indent="-342900">
+              <a:buFont typeface="Arial" panose="020B0604020202020204" pitchFamily="34" charset="0"/>
+              <a:buChar char="•"/>
+            </a:pPr>
+            <a:endParaRPr lang="en-US" dirty="0"/>
+          </a:p>
+          <a:p>
             <a:pPr marL="342900" indent="-342900">
               <a:buFont typeface="Arial" panose="020B0604020202020204" pitchFamily="34" charset="0"/>
               <a:buChar char="•"/>
             </a:pPr>
+            <a:r>
+              <a:rPr lang="en-US" dirty="0"/>
+              <a:t>ASP.NET Core</a:t>
+            </a:r>
+          </a:p>
+          <a:p>
+            <a:pPr marL="573088" lvl="1" indent="-342900">
+              <a:buFont typeface="Arial" panose="020B0604020202020204" pitchFamily="34" charset="0"/>
+              <a:buChar char="•"/>
+            </a:pPr>
+            <a:r>
+              <a:rPr lang="en-US" dirty="0" err="1"/>
+              <a:t>Program.cs</a:t>
+            </a:r>
+            <a:r>
+              <a:rPr lang="en-US" dirty="0"/>
+              <a:t> – console application</a:t>
+            </a:r>
+          </a:p>
+          <a:p>
+            <a:pPr marL="573088" lvl="1" indent="-342900">
+              <a:buFont typeface="Arial" panose="020B0604020202020204" pitchFamily="34" charset="0"/>
+              <a:buChar char="•"/>
+            </a:pPr>
+            <a:r>
+              <a:rPr lang="en-US" dirty="0" err="1"/>
+              <a:t>Startup.cs</a:t>
+            </a:r>
+            <a:r>
+              <a:rPr lang="en-US" dirty="0"/>
+              <a:t> – used by </a:t>
+            </a:r>
+            <a:r>
+              <a:rPr lang="en-US" dirty="0" err="1"/>
+              <a:t>Program.cs</a:t>
+            </a:r>
+            <a:endParaRPr lang="en-US" dirty="0"/>
+          </a:p>
+          <a:p>
+            <a:pPr marL="573088" lvl="1" indent="-342900">
+              <a:buFont typeface="Arial" panose="020B0604020202020204" pitchFamily="34" charset="0"/>
+              <a:buChar char="•"/>
+            </a:pPr>
+            <a:r>
+              <a:rPr lang="en-US" dirty="0">
+                <a:solidFill>
+                  <a:srgbClr val="0000FF"/>
+                </a:solidFill>
+                <a:latin typeface="Consolas" panose="020B0609020204030204" pitchFamily="49" charset="0"/>
+              </a:rPr>
+              <a:t>public</a:t>
+            </a:r>
+            <a:r>
+              <a:rPr lang="en-US" dirty="0">
+                <a:solidFill>
+                  <a:srgbClr val="000000"/>
+                </a:solidFill>
+                <a:latin typeface="Consolas" panose="020B0609020204030204" pitchFamily="49" charset="0"/>
+              </a:rPr>
+              <a:t> </a:t>
+            </a:r>
+            <a:r>
+              <a:rPr lang="en-US" dirty="0">
+                <a:solidFill>
+                  <a:srgbClr val="0000FF"/>
+                </a:solidFill>
+                <a:latin typeface="Consolas" panose="020B0609020204030204" pitchFamily="49" charset="0"/>
+              </a:rPr>
+              <a:t>void</a:t>
+            </a:r>
+            <a:r>
+              <a:rPr lang="en-US" dirty="0">
+                <a:solidFill>
+                  <a:srgbClr val="000000"/>
+                </a:solidFill>
+                <a:latin typeface="Consolas" panose="020B0609020204030204" pitchFamily="49" charset="0"/>
+              </a:rPr>
+              <a:t> </a:t>
+            </a:r>
+            <a:r>
+              <a:rPr lang="en-US" dirty="0" err="1">
+                <a:solidFill>
+                  <a:srgbClr val="000000"/>
+                </a:solidFill>
+                <a:latin typeface="Consolas" panose="020B0609020204030204" pitchFamily="49" charset="0"/>
+              </a:rPr>
+              <a:t>ConfigureServices</a:t>
+            </a:r>
+            <a:r>
+              <a:rPr lang="en-US" dirty="0">
+                <a:solidFill>
+                  <a:srgbClr val="000000"/>
+                </a:solidFill>
+                <a:latin typeface="Consolas" panose="020B0609020204030204" pitchFamily="49" charset="0"/>
+              </a:rPr>
+              <a:t>(</a:t>
+            </a:r>
+            <a:r>
+              <a:rPr lang="en-US" dirty="0" err="1">
+                <a:solidFill>
+                  <a:srgbClr val="2B91AF"/>
+                </a:solidFill>
+                <a:latin typeface="Consolas" panose="020B0609020204030204" pitchFamily="49" charset="0"/>
+              </a:rPr>
+              <a:t>IServiceCollection</a:t>
+            </a:r>
+            <a:r>
+              <a:rPr lang="en-US" dirty="0">
+                <a:solidFill>
+                  <a:srgbClr val="000000"/>
+                </a:solidFill>
+                <a:latin typeface="Consolas" panose="020B0609020204030204" pitchFamily="49" charset="0"/>
+              </a:rPr>
+              <a:t> services)</a:t>
+            </a:r>
+          </a:p>
+          <a:p>
+            <a:pPr marL="573088" lvl="1" indent="-342900">
+              <a:buFont typeface="Arial" panose="020B0604020202020204" pitchFamily="34" charset="0"/>
+              <a:buChar char="•"/>
+            </a:pPr>
+            <a:r>
+              <a:rPr lang="en-US" sz="1100" dirty="0">
+                <a:solidFill>
+                  <a:srgbClr val="0000FF"/>
+                </a:solidFill>
+                <a:latin typeface="Consolas" panose="020B0609020204030204" pitchFamily="49" charset="0"/>
+              </a:rPr>
+              <a:t>public</a:t>
+            </a:r>
+            <a:r>
+              <a:rPr lang="en-US" sz="1100" dirty="0">
+                <a:solidFill>
+                  <a:srgbClr val="000000"/>
+                </a:solidFill>
+                <a:latin typeface="Consolas" panose="020B0609020204030204" pitchFamily="49" charset="0"/>
+              </a:rPr>
+              <a:t> </a:t>
+            </a:r>
+            <a:r>
+              <a:rPr lang="en-US" sz="1100" dirty="0">
+                <a:solidFill>
+                  <a:srgbClr val="0000FF"/>
+                </a:solidFill>
+                <a:latin typeface="Consolas" panose="020B0609020204030204" pitchFamily="49" charset="0"/>
+              </a:rPr>
+              <a:t>void</a:t>
+            </a:r>
+            <a:r>
+              <a:rPr lang="en-US" sz="1100" dirty="0">
+                <a:solidFill>
+                  <a:srgbClr val="000000"/>
+                </a:solidFill>
+                <a:latin typeface="Consolas" panose="020B0609020204030204" pitchFamily="49" charset="0"/>
+              </a:rPr>
+              <a:t> Configure(</a:t>
+            </a:r>
+            <a:r>
+              <a:rPr lang="en-US" sz="1100" dirty="0" err="1">
+                <a:solidFill>
+                  <a:srgbClr val="2B91AF"/>
+                </a:solidFill>
+                <a:latin typeface="Consolas" panose="020B0609020204030204" pitchFamily="49" charset="0"/>
+              </a:rPr>
+              <a:t>IApplicationBuilder</a:t>
+            </a:r>
+            <a:r>
+              <a:rPr lang="en-US" sz="1100" dirty="0">
+                <a:solidFill>
+                  <a:srgbClr val="000000"/>
+                </a:solidFill>
+                <a:latin typeface="Consolas" panose="020B0609020204030204" pitchFamily="49" charset="0"/>
+              </a:rPr>
+              <a:t> app, </a:t>
+            </a:r>
+            <a:r>
+              <a:rPr lang="en-US" sz="1100" dirty="0" err="1">
+                <a:solidFill>
+                  <a:srgbClr val="2B91AF"/>
+                </a:solidFill>
+                <a:latin typeface="Consolas" panose="020B0609020204030204" pitchFamily="49" charset="0"/>
+              </a:rPr>
+              <a:t>IHostingEnvironment</a:t>
+            </a:r>
+            <a:r>
+              <a:rPr lang="en-US" sz="1100" dirty="0">
+                <a:solidFill>
+                  <a:srgbClr val="000000"/>
+                </a:solidFill>
+                <a:latin typeface="Consolas" panose="020B0609020204030204" pitchFamily="49" charset="0"/>
+              </a:rPr>
+              <a:t> </a:t>
+            </a:r>
+            <a:r>
+              <a:rPr lang="en-US" sz="1100" dirty="0" err="1">
+                <a:solidFill>
+                  <a:srgbClr val="000000"/>
+                </a:solidFill>
+                <a:latin typeface="Consolas" panose="020B0609020204030204" pitchFamily="49" charset="0"/>
+              </a:rPr>
+              <a:t>env</a:t>
+            </a:r>
+            <a:r>
+              <a:rPr lang="en-US" sz="1100" dirty="0">
+                <a:solidFill>
+                  <a:srgbClr val="000000"/>
+                </a:solidFill>
+                <a:latin typeface="Consolas" panose="020B0609020204030204" pitchFamily="49" charset="0"/>
+              </a:rPr>
+              <a:t>, </a:t>
+            </a:r>
+            <a:r>
+              <a:rPr lang="en-US" sz="1100" dirty="0" err="1">
+                <a:solidFill>
+                  <a:srgbClr val="2B91AF"/>
+                </a:solidFill>
+                <a:latin typeface="Consolas" panose="020B0609020204030204" pitchFamily="49" charset="0"/>
+              </a:rPr>
+              <a:t>ILoggerFactory</a:t>
+            </a:r>
+            <a:r>
+              <a:rPr lang="en-US" sz="1100" dirty="0">
+                <a:solidFill>
+                  <a:srgbClr val="000000"/>
+                </a:solidFill>
+                <a:latin typeface="Consolas" panose="020B0609020204030204" pitchFamily="49" charset="0"/>
+              </a:rPr>
+              <a:t> </a:t>
+            </a:r>
+            <a:r>
+              <a:rPr lang="en-US" sz="1100" dirty="0" err="1">
+                <a:solidFill>
+                  <a:srgbClr val="000000"/>
+                </a:solidFill>
+                <a:latin typeface="Consolas" panose="020B0609020204030204" pitchFamily="49" charset="0"/>
+              </a:rPr>
+              <a:t>loggerFactory</a:t>
+            </a:r>
+            <a:r>
+              <a:rPr lang="en-US" sz="1100" dirty="0">
+                <a:solidFill>
+                  <a:srgbClr val="000000"/>
+                </a:solidFill>
+                <a:latin typeface="Consolas" panose="020B0609020204030204" pitchFamily="49" charset="0"/>
+              </a:rPr>
+              <a:t>)</a:t>
+            </a:r>
             <a:endParaRPr lang="en-US" dirty="0"/>
           </a:p>
         </p:txBody>
@@ -7964,7 +9156,7 @@
     </p:spTree>
     <p:extLst>
       <p:ext uri="{BB962C8B-B14F-4D97-AF65-F5344CB8AC3E}">
-        <p14:creationId xmlns:p14="http://schemas.microsoft.com/office/powerpoint/2010/main" val="2942029158"/>
+        <p14:creationId xmlns:p14="http://schemas.microsoft.com/office/powerpoint/2010/main" val="1505097641"/>
       </p:ext>
     </p:extLst>
   </p:cSld>
@@ -8008,7 +9200,7 @@
           <a:p>
             <a:r>
               <a:rPr lang="en-US" dirty="0"/>
-              <a:t>ASP.NET Core</a:t>
+              <a:t>Configuration</a:t>
             </a:r>
           </a:p>
         </p:txBody>
@@ -8034,24 +9226,78 @@
             </a:pPr>
             <a:r>
               <a:rPr lang="en-US" dirty="0"/>
-              <a:t>Look for TODOs</a:t>
-            </a:r>
+              <a:t>ASP.NET</a:t>
+            </a:r>
+          </a:p>
+          <a:p>
+            <a:pPr marL="573088" lvl="1" indent="-342900">
+              <a:buFont typeface="Arial" panose="020B0604020202020204" pitchFamily="34" charset="0"/>
+              <a:buChar char="•"/>
+            </a:pPr>
+            <a:r>
+              <a:rPr lang="en-US" dirty="0" err="1"/>
+              <a:t>Web.config</a:t>
+            </a:r>
+            <a:r>
+              <a:rPr lang="en-US" dirty="0"/>
+              <a:t> (XML)</a:t>
+            </a:r>
+          </a:p>
+          <a:p>
+            <a:pPr marL="573088" lvl="1" indent="-342900">
+              <a:buFont typeface="Arial" panose="020B0604020202020204" pitchFamily="34" charset="0"/>
+              <a:buChar char="•"/>
+            </a:pPr>
+            <a:r>
+              <a:rPr lang="en-US" dirty="0" err="1">
+                <a:solidFill>
+                  <a:srgbClr val="2B91AF"/>
+                </a:solidFill>
+                <a:latin typeface="Consolas" panose="020B0609020204030204" pitchFamily="49" charset="0"/>
+              </a:rPr>
+              <a:t>ConfigurationManager</a:t>
+            </a:r>
+            <a:r>
+              <a:rPr lang="en-US" dirty="0" err="1">
+                <a:solidFill>
+                  <a:srgbClr val="000000"/>
+                </a:solidFill>
+                <a:latin typeface="Consolas" panose="020B0609020204030204" pitchFamily="49" charset="0"/>
+              </a:rPr>
+              <a:t>.AppSettings</a:t>
+            </a:r>
+            <a:endParaRPr lang="en-US" dirty="0">
+              <a:solidFill>
+                <a:srgbClr val="000000"/>
+              </a:solidFill>
+              <a:latin typeface="Consolas" panose="020B0609020204030204" pitchFamily="49" charset="0"/>
+            </a:endParaRPr>
+          </a:p>
+          <a:p>
+            <a:pPr marL="573088" lvl="1" indent="-342900">
+              <a:buFont typeface="Arial" panose="020B0604020202020204" pitchFamily="34" charset="0"/>
+              <a:buChar char="•"/>
+            </a:pPr>
+            <a:endParaRPr lang="en-US" dirty="0">
+              <a:solidFill>
+                <a:srgbClr val="000000"/>
+              </a:solidFill>
+              <a:latin typeface="Consolas" panose="020B0609020204030204" pitchFamily="49" charset="0"/>
+            </a:endParaRPr>
           </a:p>
           <a:p>
             <a:pPr marL="342900" indent="-342900">
               <a:buFont typeface="Arial" panose="020B0604020202020204" pitchFamily="34" charset="0"/>
               <a:buChar char="•"/>
             </a:pPr>
-            <a:endParaRPr lang="en-US" dirty="0"/>
-          </a:p>
-          <a:p>
-            <a:pPr marL="342900" indent="-342900">
-              <a:buFont typeface="Arial" panose="020B0604020202020204" pitchFamily="34" charset="0"/>
-              <a:buChar char="•"/>
-            </a:pPr>
-            <a:r>
-              <a:rPr lang="en-US" dirty="0"/>
-              <a:t>Files included:</a:t>
+            <a:r>
+              <a:rPr lang="en-US" dirty="0">
+                <a:solidFill>
+                  <a:srgbClr val="000000"/>
+                </a:solidFill>
+                <a:latin typeface="Consolas" panose="020B0609020204030204" pitchFamily="49" charset="0"/>
+              </a:rPr>
+              <a:t>ASP.NET Core</a:t>
             </a:r>
           </a:p>
           <a:p>
@@ -8059,21 +9305,242 @@
               <a:buFont typeface="Arial" panose="020B0604020202020204" pitchFamily="34" charset="0"/>
               <a:buChar char="•"/>
             </a:pPr>
+            <a:r>
+              <a:rPr lang="en-US" dirty="0" err="1"/>
+              <a:t>appsettings.json</a:t>
+            </a:r>
+            <a:r>
+              <a:rPr lang="en-US" dirty="0"/>
+              <a:t> (JSON)</a:t>
+            </a:r>
+          </a:p>
+          <a:p>
+            <a:r>
+              <a:rPr lang="en-US" dirty="0">
+                <a:solidFill>
+                  <a:srgbClr val="000000"/>
+                </a:solidFill>
+                <a:latin typeface="Consolas" panose="020B0609020204030204" pitchFamily="49" charset="0"/>
+              </a:rPr>
+              <a:t> 	</a:t>
+            </a:r>
             <a:endParaRPr lang="en-US" dirty="0"/>
           </a:p>
-          <a:p>
-            <a:pPr marL="342900" indent="-342900">
-              <a:buFont typeface="Arial" panose="020B0604020202020204" pitchFamily="34" charset="0"/>
-              <a:buChar char="•"/>
-            </a:pPr>
-            <a:endParaRPr lang="en-US" dirty="0"/>
+        </p:txBody>
+      </p:sp>
+      <p:sp>
+        <p:nvSpPr>
+          <p:cNvPr id="4" name="Rectangle 3"/>
+          <p:cNvSpPr/>
+          <p:nvPr/>
+        </p:nvSpPr>
+        <p:spPr>
+          <a:xfrm>
+            <a:off x="876299" y="2924860"/>
+            <a:ext cx="8143875" cy="738664"/>
+          </a:xfrm>
+          <a:prstGeom prst="rect">
+            <a:avLst/>
+          </a:prstGeom>
+        </p:spPr>
+        <p:txBody>
+          <a:bodyPr wrap="square">
+            <a:spAutoFit/>
+          </a:bodyPr>
+          <a:lstStyle/>
+          <a:p>
+            <a:r>
+              <a:rPr lang="en-US" sz="1400" dirty="0" err="1">
+                <a:solidFill>
+                  <a:srgbClr val="2B91AF"/>
+                </a:solidFill>
+                <a:latin typeface="Consolas" panose="020B0609020204030204" pitchFamily="49" charset="0"/>
+              </a:rPr>
+              <a:t>IConfigurationSection</a:t>
+            </a:r>
+            <a:r>
+              <a:rPr lang="en-US" sz="1400" dirty="0">
+                <a:solidFill>
+                  <a:srgbClr val="000000"/>
+                </a:solidFill>
+                <a:latin typeface="Consolas" panose="020B0609020204030204" pitchFamily="49" charset="0"/>
+              </a:rPr>
+              <a:t> </a:t>
+            </a:r>
+            <a:r>
+              <a:rPr lang="en-US" sz="1400" dirty="0" err="1">
+                <a:solidFill>
+                  <a:srgbClr val="000000"/>
+                </a:solidFill>
+                <a:latin typeface="Consolas" panose="020B0609020204030204" pitchFamily="49" charset="0"/>
+              </a:rPr>
+              <a:t>settingsSection</a:t>
+            </a:r>
+            <a:r>
+              <a:rPr lang="en-US" sz="1400" dirty="0">
+                <a:solidFill>
+                  <a:srgbClr val="000000"/>
+                </a:solidFill>
+                <a:latin typeface="Consolas" panose="020B0609020204030204" pitchFamily="49" charset="0"/>
+              </a:rPr>
+              <a:t> = </a:t>
+            </a:r>
+            <a:r>
+              <a:rPr lang="en-US" sz="1400" dirty="0" err="1">
+                <a:solidFill>
+                  <a:srgbClr val="000000"/>
+                </a:solidFill>
+                <a:latin typeface="Consolas" panose="020B0609020204030204" pitchFamily="49" charset="0"/>
+              </a:rPr>
+              <a:t>Configuration.GetSection</a:t>
+            </a:r>
+            <a:r>
+              <a:rPr lang="en-US" sz="1400" dirty="0">
+                <a:solidFill>
+                  <a:srgbClr val="000000"/>
+                </a:solidFill>
+                <a:latin typeface="Consolas" panose="020B0609020204030204" pitchFamily="49" charset="0"/>
+              </a:rPr>
+              <a:t>(</a:t>
+            </a:r>
+            <a:r>
+              <a:rPr lang="en-US" sz="1400" dirty="0">
+                <a:solidFill>
+                  <a:srgbClr val="A31515"/>
+                </a:solidFill>
+                <a:latin typeface="Consolas" panose="020B0609020204030204" pitchFamily="49" charset="0"/>
+              </a:rPr>
+              <a:t>"</a:t>
+            </a:r>
+            <a:r>
+              <a:rPr lang="en-US" sz="1400" dirty="0" err="1">
+                <a:solidFill>
+                  <a:srgbClr val="A31515"/>
+                </a:solidFill>
+                <a:latin typeface="Consolas" panose="020B0609020204030204" pitchFamily="49" charset="0"/>
+              </a:rPr>
+              <a:t>MySettings</a:t>
+            </a:r>
+            <a:r>
+              <a:rPr lang="en-US" sz="1400" dirty="0">
+                <a:solidFill>
+                  <a:srgbClr val="A31515"/>
+                </a:solidFill>
+                <a:latin typeface="Consolas" panose="020B0609020204030204" pitchFamily="49" charset="0"/>
+              </a:rPr>
+              <a:t>"</a:t>
+            </a:r>
+            <a:r>
+              <a:rPr lang="en-US" sz="1400" dirty="0">
+                <a:solidFill>
+                  <a:srgbClr val="000000"/>
+                </a:solidFill>
+                <a:latin typeface="Consolas" panose="020B0609020204030204" pitchFamily="49" charset="0"/>
+              </a:rPr>
+              <a:t>);</a:t>
+            </a:r>
+          </a:p>
+          <a:p>
+            <a:r>
+              <a:rPr lang="nb-NO" sz="1400" dirty="0">
+                <a:solidFill>
+                  <a:srgbClr val="2B91AF"/>
+                </a:solidFill>
+                <a:latin typeface="Consolas" panose="020B0609020204030204" pitchFamily="49" charset="0"/>
+              </a:rPr>
+              <a:t>MySettings</a:t>
+            </a:r>
+            <a:r>
+              <a:rPr lang="nb-NO" sz="1400" dirty="0">
+                <a:solidFill>
+                  <a:srgbClr val="000000"/>
+                </a:solidFill>
+                <a:latin typeface="Consolas" panose="020B0609020204030204" pitchFamily="49" charset="0"/>
+              </a:rPr>
+              <a:t> settings = settingsSection.Get&lt;</a:t>
+            </a:r>
+            <a:r>
+              <a:rPr lang="nb-NO" sz="1400" dirty="0">
+                <a:solidFill>
+                  <a:srgbClr val="2B91AF"/>
+                </a:solidFill>
+                <a:latin typeface="Consolas" panose="020B0609020204030204" pitchFamily="49" charset="0"/>
+              </a:rPr>
+              <a:t>MySettings</a:t>
+            </a:r>
+            <a:r>
+              <a:rPr lang="nb-NO" sz="1400" dirty="0">
+                <a:solidFill>
+                  <a:srgbClr val="000000"/>
+                </a:solidFill>
+                <a:latin typeface="Consolas" panose="020B0609020204030204" pitchFamily="49" charset="0"/>
+              </a:rPr>
+              <a:t>&gt;();</a:t>
+            </a:r>
+          </a:p>
+          <a:p>
+            <a:r>
+              <a:rPr lang="en-US" sz="1400" dirty="0" err="1">
+                <a:solidFill>
+                  <a:srgbClr val="000000"/>
+                </a:solidFill>
+                <a:latin typeface="Consolas" panose="020B0609020204030204" pitchFamily="49" charset="0"/>
+              </a:rPr>
+              <a:t>services.Configure</a:t>
+            </a:r>
+            <a:r>
+              <a:rPr lang="en-US" sz="1400" dirty="0">
+                <a:solidFill>
+                  <a:srgbClr val="000000"/>
+                </a:solidFill>
+                <a:latin typeface="Consolas" panose="020B0609020204030204" pitchFamily="49" charset="0"/>
+              </a:rPr>
+              <a:t>&lt;</a:t>
+            </a:r>
+            <a:r>
+              <a:rPr lang="en-US" sz="1400" dirty="0" err="1">
+                <a:solidFill>
+                  <a:srgbClr val="2B91AF"/>
+                </a:solidFill>
+                <a:latin typeface="Consolas" panose="020B0609020204030204" pitchFamily="49" charset="0"/>
+              </a:rPr>
+              <a:t>MySettings</a:t>
+            </a:r>
+            <a:r>
+              <a:rPr lang="en-US" sz="1400" dirty="0">
+                <a:solidFill>
+                  <a:srgbClr val="000000"/>
+                </a:solidFill>
+                <a:latin typeface="Consolas" panose="020B0609020204030204" pitchFamily="49" charset="0"/>
+              </a:rPr>
+              <a:t>&gt;(</a:t>
+            </a:r>
+            <a:r>
+              <a:rPr lang="en-US" sz="1400" dirty="0" err="1">
+                <a:solidFill>
+                  <a:srgbClr val="000000"/>
+                </a:solidFill>
+                <a:latin typeface="Consolas" panose="020B0609020204030204" pitchFamily="49" charset="0"/>
+              </a:rPr>
+              <a:t>settingsSection</a:t>
+            </a:r>
+            <a:r>
+              <a:rPr lang="en-US" sz="1400" dirty="0">
+                <a:solidFill>
+                  <a:srgbClr val="000000"/>
+                </a:solidFill>
+                <a:latin typeface="Consolas" panose="020B0609020204030204" pitchFamily="49" charset="0"/>
+              </a:rPr>
+              <a:t>);</a:t>
+            </a:r>
+            <a:endParaRPr lang="en-US" sz="3600" dirty="0"/>
           </a:p>
         </p:txBody>
       </p:sp>
     </p:spTree>
     <p:extLst>
       <p:ext uri="{BB962C8B-B14F-4D97-AF65-F5344CB8AC3E}">
-        <p14:creationId xmlns:p14="http://schemas.microsoft.com/office/powerpoint/2010/main" val="3351451"/>
+        <p14:creationId xmlns:p14="http://schemas.microsoft.com/office/powerpoint/2010/main" val="722562928"/>
       </p:ext>
     </p:extLst>
   </p:cSld>
@@ -8117,7 +9584,7 @@
           <a:p>
             <a:r>
               <a:rPr lang="en-US" dirty="0"/>
-              <a:t>How to execute</a:t>
+              <a:t>Static Files</a:t>
             </a:r>
           </a:p>
         </p:txBody>
@@ -8137,23 +9604,31 @@
           <a:bodyPr/>
           <a:lstStyle/>
           <a:p>
-            <a:r>
-              <a:rPr lang="en-US" dirty="0"/>
-              <a:t>Execute RESTful API backend:</a:t>
-            </a:r>
-          </a:p>
-          <a:p>
-            <a:endParaRPr lang="en-US" dirty="0"/>
-          </a:p>
-          <a:p>
             <a:pPr marL="342900" indent="-342900">
               <a:buFont typeface="Arial" panose="020B0604020202020204" pitchFamily="34" charset="0"/>
               <a:buChar char="•"/>
             </a:pPr>
             <a:r>
               <a:rPr lang="en-US" dirty="0"/>
-              <a:t>Visual Studio: F5 (or ctrl+f5)</a:t>
-            </a:r>
+              <a:t>ASP.NET</a:t>
+            </a:r>
+          </a:p>
+          <a:p>
+            <a:pPr marL="573088" lvl="1" indent="-342900">
+              <a:buFont typeface="Arial" panose="020B0604020202020204" pitchFamily="34" charset="0"/>
+              <a:buChar char="•"/>
+            </a:pPr>
+            <a:r>
+              <a:rPr lang="en-US" dirty="0"/>
+              <a:t>Put static files wherever</a:t>
+            </a:r>
+          </a:p>
+          <a:p>
+            <a:pPr marL="573088" lvl="1" indent="-342900">
+              <a:buFont typeface="Arial" panose="020B0604020202020204" pitchFamily="34" charset="0"/>
+              <a:buChar char="•"/>
+            </a:pPr>
+            <a:endParaRPr lang="en-US" dirty="0"/>
           </a:p>
           <a:p>
             <a:pPr marL="342900" indent="-342900">
@@ -8161,20 +9636,26 @@
               <a:buChar char="•"/>
             </a:pPr>
             <a:r>
-              <a:rPr lang="en-US" dirty="0" err="1">
-                <a:latin typeface="Consolas" panose="020B0609020204030204" pitchFamily="49" charset="0"/>
-              </a:rPr>
-              <a:t>dotnet</a:t>
-            </a:r>
-            <a:r>
-              <a:rPr lang="en-US" dirty="0">
-                <a:latin typeface="Consolas" panose="020B0609020204030204" pitchFamily="49" charset="0"/>
-              </a:rPr>
-              <a:t> run</a:t>
-            </a:r>
-            <a:r>
-              <a:rPr lang="en-US" dirty="0"/>
-              <a:t> from command line</a:t>
+              <a:rPr lang="en-US" dirty="0"/>
+              <a:t>ASP.NET Core</a:t>
+            </a:r>
+          </a:p>
+          <a:p>
+            <a:pPr marL="573088" lvl="1" indent="-342900">
+              <a:buFont typeface="Arial" panose="020B0604020202020204" pitchFamily="34" charset="0"/>
+              <a:buChar char="•"/>
+            </a:pPr>
+            <a:r>
+              <a:rPr lang="en-US" dirty="0"/>
+              <a:t>Put static files in </a:t>
+            </a:r>
+            <a:r>
+              <a:rPr lang="en-US" dirty="0" err="1"/>
+              <a:t>wwwroot</a:t>
+            </a:r>
+            <a:r>
+              <a:rPr lang="en-US" dirty="0"/>
+              <a:t> folder</a:t>
             </a:r>
           </a:p>
         </p:txBody>
@@ -8182,7 +9663,7 @@
     </p:spTree>
     <p:extLst>
       <p:ext uri="{BB962C8B-B14F-4D97-AF65-F5344CB8AC3E}">
-        <p14:creationId xmlns:p14="http://schemas.microsoft.com/office/powerpoint/2010/main" val="1504837512"/>
+        <p14:creationId xmlns:p14="http://schemas.microsoft.com/office/powerpoint/2010/main" val="1317357965"/>
       </p:ext>
     </p:extLst>
   </p:cSld>
@@ -8216,6 +9697,322 @@
             <a:spLocks noGrp="1"/>
           </p:cNvSpPr>
           <p:nvPr>
+            <p:ph type="title"/>
+          </p:nvPr>
+        </p:nvSpPr>
+        <p:spPr/>
+        <p:txBody>
+          <a:bodyPr/>
+          <a:lstStyle/>
+          <a:p>
+            <a:r>
+              <a:rPr lang="en-US" dirty="0"/>
+              <a:t>Casing / </a:t>
+            </a:r>
+            <a:r>
+              <a:rPr lang="en-US" dirty="0" err="1"/>
+              <a:t>JsonProperty</a:t>
+            </a:r>
+            <a:endParaRPr lang="en-US" dirty="0"/>
+          </a:p>
+        </p:txBody>
+      </p:sp>
+      <p:sp>
+        <p:nvSpPr>
+          <p:cNvPr id="3" name="Content Placeholder 2"/>
+          <p:cNvSpPr>
+            <a:spLocks noGrp="1"/>
+          </p:cNvSpPr>
+          <p:nvPr>
+            <p:ph idx="1"/>
+          </p:nvPr>
+        </p:nvSpPr>
+        <p:spPr/>
+        <p:txBody>
+          <a:bodyPr/>
+          <a:lstStyle/>
+          <a:p>
+            <a:pPr marL="342900" indent="-342900">
+              <a:buFont typeface="Arial" panose="020B0604020202020204" pitchFamily="34" charset="0"/>
+              <a:buChar char="•"/>
+            </a:pPr>
+            <a:r>
+              <a:rPr lang="en-US" dirty="0"/>
+              <a:t>ASP.NET</a:t>
+            </a:r>
+          </a:p>
+          <a:p>
+            <a:pPr marL="573088" lvl="1" indent="-342900">
+              <a:buFont typeface="Arial" panose="020B0604020202020204" pitchFamily="34" charset="0"/>
+              <a:buChar char="•"/>
+            </a:pPr>
+            <a:r>
+              <a:rPr lang="en-US" dirty="0">
+                <a:solidFill>
+                  <a:srgbClr val="0000FF"/>
+                </a:solidFill>
+                <a:latin typeface="Consolas" panose="020B0609020204030204" pitchFamily="49" charset="0"/>
+              </a:rPr>
+              <a:t>return</a:t>
+            </a:r>
+            <a:r>
+              <a:rPr lang="en-US" dirty="0">
+                <a:solidFill>
+                  <a:srgbClr val="000000"/>
+                </a:solidFill>
+                <a:latin typeface="Consolas" panose="020B0609020204030204" pitchFamily="49" charset="0"/>
+              </a:rPr>
+              <a:t> Ok(</a:t>
+            </a:r>
+            <a:r>
+              <a:rPr lang="en-US" dirty="0" err="1">
+                <a:solidFill>
+                  <a:srgbClr val="000000"/>
+                </a:solidFill>
+                <a:latin typeface="Consolas" panose="020B0609020204030204" pitchFamily="49" charset="0"/>
+              </a:rPr>
+              <a:t>result.Value</a:t>
+            </a:r>
+            <a:r>
+              <a:rPr lang="en-US" dirty="0">
+                <a:solidFill>
+                  <a:srgbClr val="000000"/>
+                </a:solidFill>
+                <a:latin typeface="Consolas" panose="020B0609020204030204" pitchFamily="49" charset="0"/>
+              </a:rPr>
+              <a:t>);</a:t>
+            </a:r>
+          </a:p>
+          <a:p>
+            <a:pPr marL="573088" lvl="1" indent="-342900">
+              <a:buFont typeface="Arial" panose="020B0604020202020204" pitchFamily="34" charset="0"/>
+              <a:buChar char="•"/>
+            </a:pPr>
+            <a:r>
+              <a:rPr lang="en-US" dirty="0"/>
+              <a:t>Result object serialized</a:t>
+            </a:r>
+          </a:p>
+          <a:p>
+            <a:pPr marL="573088" lvl="1" indent="-342900">
+              <a:buFont typeface="Arial" panose="020B0604020202020204" pitchFamily="34" charset="0"/>
+              <a:buChar char="•"/>
+            </a:pPr>
+            <a:r>
+              <a:rPr lang="en-US" dirty="0"/>
+              <a:t>Resultant JSON is </a:t>
+            </a:r>
+            <a:r>
+              <a:rPr lang="en-US" dirty="0" err="1"/>
+              <a:t>PascalCased</a:t>
+            </a:r>
+            <a:endParaRPr lang="en-US" dirty="0"/>
+          </a:p>
+          <a:p>
+            <a:pPr marL="573088" lvl="1" indent="-342900">
+              <a:buFont typeface="Arial" panose="020B0604020202020204" pitchFamily="34" charset="0"/>
+              <a:buChar char="•"/>
+            </a:pPr>
+            <a:endParaRPr lang="en-US" dirty="0"/>
+          </a:p>
+          <a:p>
+            <a:pPr marL="342900" indent="-342900">
+              <a:buFont typeface="Arial" panose="020B0604020202020204" pitchFamily="34" charset="0"/>
+              <a:buChar char="•"/>
+            </a:pPr>
+            <a:r>
+              <a:rPr lang="en-US" dirty="0"/>
+              <a:t>ASP.NET Core</a:t>
+            </a:r>
+          </a:p>
+          <a:p>
+            <a:pPr marL="573088" lvl="1" indent="-342900">
+              <a:buFont typeface="Arial" panose="020B0604020202020204" pitchFamily="34" charset="0"/>
+              <a:buChar char="•"/>
+            </a:pPr>
+            <a:r>
+              <a:rPr lang="en-US" dirty="0">
+                <a:solidFill>
+                  <a:srgbClr val="0000FF"/>
+                </a:solidFill>
+                <a:latin typeface="Consolas" panose="020B0609020204030204" pitchFamily="49" charset="0"/>
+              </a:rPr>
+              <a:t>return</a:t>
+            </a:r>
+            <a:r>
+              <a:rPr lang="en-US" dirty="0">
+                <a:solidFill>
+                  <a:srgbClr val="000000"/>
+                </a:solidFill>
+                <a:latin typeface="Consolas" panose="020B0609020204030204" pitchFamily="49" charset="0"/>
+              </a:rPr>
+              <a:t> Ok(</a:t>
+            </a:r>
+            <a:r>
+              <a:rPr lang="en-US" dirty="0" err="1">
+                <a:solidFill>
+                  <a:srgbClr val="000000"/>
+                </a:solidFill>
+                <a:latin typeface="Consolas" panose="020B0609020204030204" pitchFamily="49" charset="0"/>
+              </a:rPr>
+              <a:t>result.Value</a:t>
+            </a:r>
+            <a:r>
+              <a:rPr lang="en-US" dirty="0">
+                <a:solidFill>
+                  <a:srgbClr val="000000"/>
+                </a:solidFill>
+                <a:latin typeface="Consolas" panose="020B0609020204030204" pitchFamily="49" charset="0"/>
+              </a:rPr>
+              <a:t>);</a:t>
+            </a:r>
+          </a:p>
+          <a:p>
+            <a:pPr marL="573088" lvl="1" indent="-342900">
+              <a:buFont typeface="Arial" panose="020B0604020202020204" pitchFamily="34" charset="0"/>
+              <a:buChar char="•"/>
+            </a:pPr>
+            <a:r>
+              <a:rPr lang="en-US" dirty="0"/>
+              <a:t>Result object serialized</a:t>
+            </a:r>
+          </a:p>
+          <a:p>
+            <a:pPr marL="573088" lvl="1" indent="-342900">
+              <a:buFont typeface="Arial" panose="020B0604020202020204" pitchFamily="34" charset="0"/>
+              <a:buChar char="•"/>
+            </a:pPr>
+            <a:r>
+              <a:rPr lang="en-US" dirty="0"/>
+              <a:t>Resultant JSON is </a:t>
+            </a:r>
+            <a:r>
+              <a:rPr lang="en-US" dirty="0" err="1"/>
+              <a:t>camelCased</a:t>
+            </a:r>
+            <a:endParaRPr lang="en-US" dirty="0"/>
+          </a:p>
+          <a:p>
+            <a:pPr marL="573088" lvl="1" indent="-342900">
+              <a:buFont typeface="Arial" panose="020B0604020202020204" pitchFamily="34" charset="0"/>
+              <a:buChar char="•"/>
+            </a:pPr>
+            <a:r>
+              <a:rPr lang="en-US" dirty="0"/>
+              <a:t>Use </a:t>
+            </a:r>
+            <a:r>
+              <a:rPr lang="en-US" dirty="0">
+                <a:solidFill>
+                  <a:srgbClr val="000000"/>
+                </a:solidFill>
+                <a:latin typeface="Consolas" panose="020B0609020204030204" pitchFamily="49" charset="0"/>
+              </a:rPr>
+              <a:t>[</a:t>
+            </a:r>
+            <a:r>
+              <a:rPr lang="en-US" dirty="0" err="1">
+                <a:solidFill>
+                  <a:srgbClr val="2B91AF"/>
+                </a:solidFill>
+                <a:latin typeface="Consolas" panose="020B0609020204030204" pitchFamily="49" charset="0"/>
+              </a:rPr>
+              <a:t>JsonProperty</a:t>
+            </a:r>
+            <a:r>
+              <a:rPr lang="en-US" dirty="0">
+                <a:solidFill>
+                  <a:srgbClr val="000000"/>
+                </a:solidFill>
+                <a:latin typeface="Consolas" panose="020B0609020204030204" pitchFamily="49" charset="0"/>
+              </a:rPr>
+              <a:t>(</a:t>
+            </a:r>
+            <a:r>
+              <a:rPr lang="en-US" dirty="0">
+                <a:solidFill>
+                  <a:srgbClr val="A31515"/>
+                </a:solidFill>
+                <a:latin typeface="Consolas" panose="020B0609020204030204" pitchFamily="49" charset="0"/>
+              </a:rPr>
+              <a:t>"</a:t>
+            </a:r>
+            <a:r>
+              <a:rPr lang="en-US" dirty="0" err="1">
+                <a:solidFill>
+                  <a:srgbClr val="A31515"/>
+                </a:solidFill>
+                <a:latin typeface="Consolas" panose="020B0609020204030204" pitchFamily="49" charset="0"/>
+              </a:rPr>
+              <a:t>FirstName</a:t>
+            </a:r>
+            <a:r>
+              <a:rPr lang="en-US" dirty="0">
+                <a:solidFill>
+                  <a:srgbClr val="A31515"/>
+                </a:solidFill>
+                <a:latin typeface="Consolas" panose="020B0609020204030204" pitchFamily="49" charset="0"/>
+              </a:rPr>
+              <a:t>"</a:t>
+            </a:r>
+            <a:r>
+              <a:rPr lang="en-US" dirty="0">
+                <a:solidFill>
+                  <a:srgbClr val="000000"/>
+                </a:solidFill>
+                <a:latin typeface="Consolas" panose="020B0609020204030204" pitchFamily="49" charset="0"/>
+              </a:rPr>
+              <a:t>)]</a:t>
+            </a:r>
+            <a:r>
+              <a:rPr lang="en-US" dirty="0"/>
+              <a:t> to </a:t>
+            </a:r>
+            <a:r>
+              <a:rPr lang="en-US" dirty="0" err="1"/>
+              <a:t>PascalCase</a:t>
+            </a:r>
+            <a:endParaRPr lang="en-US" dirty="0"/>
+          </a:p>
+        </p:txBody>
+      </p:sp>
+    </p:spTree>
+    <p:extLst>
+      <p:ext uri="{BB962C8B-B14F-4D97-AF65-F5344CB8AC3E}">
+        <p14:creationId xmlns:p14="http://schemas.microsoft.com/office/powerpoint/2010/main" val="671946226"/>
+      </p:ext>
+    </p:extLst>
+  </p:cSld>
+  <p:clrMapOvr>
+    <a:masterClrMapping/>
+  </p:clrMapOvr>
+</p:sld>
+</file>
+
+<file path=ppt/slides/slide17.xml><?xml version="1.0" encoding="utf-8"?>
+<p:sld xmlns:a="http://schemas.openxmlformats.org/drawingml/2006/main" xmlns:r="http://schemas.openxmlformats.org/officeDocument/2006/relationships" xmlns:p="http://schemas.openxmlformats.org/presentationml/2006/main">
+  <p:cSld>
+    <p:spTree>
+      <p:nvGrpSpPr>
+        <p:cNvPr id="1" name=""/>
+        <p:cNvGrpSpPr/>
+        <p:nvPr/>
+      </p:nvGrpSpPr>
+      <p:grpSpPr>
+        <a:xfrm>
+          <a:off x="0" y="0"/>
+          <a:ext cx="0" cy="0"/>
+          <a:chOff x="0" y="0"/>
+          <a:chExt cx="0" cy="0"/>
+        </a:xfrm>
+      </p:grpSpPr>
+      <p:sp>
+        <p:nvSpPr>
+          <p:cNvPr id="2" name="Title 1"/>
+          <p:cNvSpPr>
+            <a:spLocks noGrp="1"/>
+          </p:cNvSpPr>
+          <p:nvPr>
             <p:ph type="ctrTitle"/>
           </p:nvPr>
         </p:nvSpPr>
@@ -8240,6 +10037,522 @@
     <p:extLst>
       <p:ext uri="{BB962C8B-B14F-4D97-AF65-F5344CB8AC3E}">
         <p14:creationId xmlns:p14="http://schemas.microsoft.com/office/powerpoint/2010/main" val="3620921753"/>
+      </p:ext>
+    </p:extLst>
+  </p:cSld>
+  <p:clrMapOvr>
+    <a:masterClrMapping/>
+  </p:clrMapOvr>
+</p:sld>
+</file>
+
+<file path=ppt/slides/slide18.xml><?xml version="1.0" encoding="utf-8"?>
+<p:sld xmlns:a="http://schemas.openxmlformats.org/drawingml/2006/main" xmlns:r="http://schemas.openxmlformats.org/officeDocument/2006/relationships" xmlns:p="http://schemas.openxmlformats.org/presentationml/2006/main">
+  <p:cSld>
+    <p:spTree>
+      <p:nvGrpSpPr>
+        <p:cNvPr id="1" name=""/>
+        <p:cNvGrpSpPr/>
+        <p:nvPr/>
+      </p:nvGrpSpPr>
+      <p:grpSpPr>
+        <a:xfrm>
+          <a:off x="0" y="0"/>
+          <a:ext cx="0" cy="0"/>
+          <a:chOff x="0" y="0"/>
+          <a:chExt cx="0" cy="0"/>
+        </a:xfrm>
+      </p:grpSpPr>
+      <p:sp>
+        <p:nvSpPr>
+          <p:cNvPr id="2" name="Title 1"/>
+          <p:cNvSpPr>
+            <a:spLocks noGrp="1"/>
+          </p:cNvSpPr>
+          <p:nvPr>
+            <p:ph type="title"/>
+          </p:nvPr>
+        </p:nvSpPr>
+        <p:spPr/>
+        <p:txBody>
+          <a:bodyPr/>
+          <a:lstStyle/>
+          <a:p>
+            <a:r>
+              <a:rPr lang="en-US" dirty="0"/>
+              <a:t>Exercise: Fill in the blanks</a:t>
+            </a:r>
+          </a:p>
+        </p:txBody>
+      </p:sp>
+      <p:sp>
+        <p:nvSpPr>
+          <p:cNvPr id="3" name="Content Placeholder 2"/>
+          <p:cNvSpPr txBox="1">
+            <a:spLocks/>
+          </p:cNvSpPr>
+          <p:nvPr/>
+        </p:nvSpPr>
+        <p:spPr>
+          <a:xfrm>
+            <a:off x="198157" y="838200"/>
+            <a:ext cx="8802967" cy="3394472"/>
+          </a:xfrm>
+          <a:prstGeom prst="rect">
+            <a:avLst/>
+          </a:prstGeom>
+        </p:spPr>
+        <p:txBody>
+          <a:bodyPr/>
+          <a:lstStyle>
+            <a:lvl1pPr marL="228600" indent="-228600" algn="l" defTabSz="457200" rtl="0" eaLnBrk="1" latinLnBrk="0" hangingPunct="1">
+              <a:spcBef>
+                <a:spcPts val="0"/>
+              </a:spcBef>
+              <a:buClr>
+                <a:schemeClr val="accent1"/>
+              </a:buClr>
+              <a:buFont typeface="Wingdings" charset="2"/>
+              <a:buChar char="§"/>
+              <a:defRPr sz="2400" kern="1200">
+                <a:solidFill>
+                  <a:schemeClr val="tx1"/>
+                </a:solidFill>
+                <a:latin typeface="+mn-lt"/>
+                <a:ea typeface="+mn-ea"/>
+                <a:cs typeface="+mn-cs"/>
+              </a:defRPr>
+            </a:lvl1pPr>
+            <a:lvl2pPr marL="455613" indent="-227013" algn="l" defTabSz="457200" rtl="0" eaLnBrk="1" latinLnBrk="0" hangingPunct="1">
+              <a:spcBef>
+                <a:spcPts val="0"/>
+              </a:spcBef>
+              <a:buClr>
+                <a:srgbClr val="262626"/>
+              </a:buClr>
+              <a:buFont typeface="Wingdings" charset="2"/>
+              <a:buChar char="§"/>
+              <a:defRPr sz="2000" kern="1200">
+                <a:solidFill>
+                  <a:schemeClr val="tx1"/>
+                </a:solidFill>
+                <a:latin typeface="+mn-lt"/>
+                <a:ea typeface="+mn-ea"/>
+                <a:cs typeface="+mn-cs"/>
+              </a:defRPr>
+            </a:lvl2pPr>
+            <a:lvl3pPr marL="455613" indent="-228600" algn="l" defTabSz="457200" rtl="0" eaLnBrk="1" latinLnBrk="0" hangingPunct="1">
+              <a:spcBef>
+                <a:spcPts val="0"/>
+              </a:spcBef>
+              <a:buClr>
+                <a:srgbClr val="262626"/>
+              </a:buClr>
+              <a:buFont typeface="Wingdings" charset="2"/>
+              <a:buChar char="§"/>
+              <a:defRPr sz="2000" kern="1200">
+                <a:solidFill>
+                  <a:schemeClr val="tx1"/>
+                </a:solidFill>
+                <a:latin typeface="+mn-lt"/>
+                <a:ea typeface="+mn-ea"/>
+                <a:cs typeface="+mn-cs"/>
+              </a:defRPr>
+            </a:lvl3pPr>
+            <a:lvl4pPr marL="455613" indent="-228600" algn="l" defTabSz="457200" rtl="0" eaLnBrk="1" latinLnBrk="0" hangingPunct="1">
+              <a:spcBef>
+                <a:spcPts val="0"/>
+              </a:spcBef>
+              <a:buClr>
+                <a:srgbClr val="262626"/>
+              </a:buClr>
+              <a:buFont typeface="Wingdings" charset="2"/>
+              <a:buChar char="§"/>
+              <a:defRPr sz="2000" kern="1200">
+                <a:solidFill>
+                  <a:schemeClr val="tx1"/>
+                </a:solidFill>
+                <a:latin typeface="+mn-lt"/>
+                <a:ea typeface="+mn-ea"/>
+                <a:cs typeface="+mn-cs"/>
+              </a:defRPr>
+            </a:lvl4pPr>
+            <a:lvl5pPr marL="455613" indent="-228600" algn="l" defTabSz="457200" rtl="0" eaLnBrk="1" latinLnBrk="0" hangingPunct="1">
+              <a:spcBef>
+                <a:spcPts val="200"/>
+              </a:spcBef>
+              <a:buClr>
+                <a:srgbClr val="262626"/>
+              </a:buClr>
+              <a:buFont typeface="Wingdings" charset="2"/>
+              <a:buChar char="§"/>
+              <a:defRPr sz="2000" kern="1200">
+                <a:solidFill>
+                  <a:schemeClr val="tx1"/>
+                </a:solidFill>
+                <a:latin typeface="+mn-lt"/>
+                <a:ea typeface="+mn-ea"/>
+                <a:cs typeface="+mn-cs"/>
+              </a:defRPr>
+            </a:lvl5pPr>
+            <a:lvl6pPr marL="2514600" indent="-228600" algn="l" defTabSz="457200" rtl="0" eaLnBrk="1" latinLnBrk="0" hangingPunct="1">
+              <a:spcBef>
+                <a:spcPct val="20000"/>
+              </a:spcBef>
+              <a:buFont typeface="Arial"/>
+              <a:buChar char="•"/>
+              <a:defRPr sz="2000" kern="1200">
+                <a:solidFill>
+                  <a:schemeClr val="tx1"/>
+                </a:solidFill>
+                <a:latin typeface="+mn-lt"/>
+                <a:ea typeface="+mn-ea"/>
+                <a:cs typeface="+mn-cs"/>
+              </a:defRPr>
+            </a:lvl6pPr>
+            <a:lvl7pPr marL="2971800" indent="-228600" algn="l" defTabSz="457200" rtl="0" eaLnBrk="1" latinLnBrk="0" hangingPunct="1">
+              <a:spcBef>
+                <a:spcPct val="20000"/>
+              </a:spcBef>
+              <a:buFont typeface="Arial"/>
+              <a:buChar char="•"/>
+              <a:defRPr sz="2000" kern="1200">
+                <a:solidFill>
+                  <a:schemeClr val="tx1"/>
+                </a:solidFill>
+                <a:latin typeface="+mn-lt"/>
+                <a:ea typeface="+mn-ea"/>
+                <a:cs typeface="+mn-cs"/>
+              </a:defRPr>
+            </a:lvl7pPr>
+            <a:lvl8pPr marL="3429000" indent="-228600" algn="l" defTabSz="457200" rtl="0" eaLnBrk="1" latinLnBrk="0" hangingPunct="1">
+              <a:spcBef>
+                <a:spcPct val="20000"/>
+              </a:spcBef>
+              <a:buFont typeface="Arial"/>
+              <a:buChar char="•"/>
+              <a:defRPr sz="2000" kern="1200">
+                <a:solidFill>
+                  <a:schemeClr val="tx1"/>
+                </a:solidFill>
+                <a:latin typeface="+mn-lt"/>
+                <a:ea typeface="+mn-ea"/>
+                <a:cs typeface="+mn-cs"/>
+              </a:defRPr>
+            </a:lvl8pPr>
+            <a:lvl9pPr marL="3886200" indent="-228600" algn="l" defTabSz="457200" rtl="0" eaLnBrk="1" latinLnBrk="0" hangingPunct="1">
+              <a:spcBef>
+                <a:spcPct val="20000"/>
+              </a:spcBef>
+              <a:buFont typeface="Arial"/>
+              <a:buChar char="•"/>
+              <a:defRPr sz="2000" kern="1200">
+                <a:solidFill>
+                  <a:schemeClr val="tx1"/>
+                </a:solidFill>
+                <a:latin typeface="+mn-lt"/>
+                <a:ea typeface="+mn-ea"/>
+                <a:cs typeface="+mn-cs"/>
+              </a:defRPr>
+            </a:lvl9pPr>
+          </a:lstStyle>
+          <a:p>
+            <a:pPr marL="342900" indent="-342900">
+              <a:buFont typeface="Arial" charset="0"/>
+              <a:buChar char="•"/>
+            </a:pPr>
+            <a:r>
+              <a:rPr lang="en-US" dirty="0"/>
+              <a:t>Fill in the blanks to make the application work</a:t>
+            </a:r>
+          </a:p>
+          <a:p>
+            <a:pPr marL="569913" lvl="1" indent="-342900">
+              <a:buFont typeface="Arial" charset="0"/>
+              <a:buChar char="•"/>
+            </a:pPr>
+            <a:r>
+              <a:rPr lang="en-US" dirty="0" err="1"/>
+              <a:t>dotnet_workshop</a:t>
+            </a:r>
+            <a:r>
+              <a:rPr lang="en-US" dirty="0"/>
+              <a:t> or </a:t>
+            </a:r>
+            <a:r>
+              <a:rPr lang="en-US" dirty="0" err="1"/>
+              <a:t>dotnetcore_workshop</a:t>
+            </a:r>
+            <a:endParaRPr lang="en-US" dirty="0"/>
+          </a:p>
+          <a:p>
+            <a:pPr marL="569913" lvl="1" indent="-342900">
+              <a:buFont typeface="Arial" charset="0"/>
+              <a:buChar char="•"/>
+            </a:pPr>
+            <a:r>
+              <a:rPr lang="en-US" dirty="0"/>
+              <a:t>Completed versions are in </a:t>
+            </a:r>
+            <a:r>
+              <a:rPr lang="en-US" dirty="0" err="1"/>
+              <a:t>dotnet</a:t>
+            </a:r>
+            <a:r>
+              <a:rPr lang="en-US" dirty="0"/>
+              <a:t>, </a:t>
+            </a:r>
+            <a:r>
+              <a:rPr lang="en-US" dirty="0" err="1"/>
+              <a:t>dotnetcore</a:t>
+            </a:r>
+            <a:endParaRPr lang="en-US" dirty="0"/>
+          </a:p>
+          <a:p>
+            <a:pPr marL="342900" indent="-342900">
+              <a:buFont typeface="Arial" charset="0"/>
+              <a:buChar char="•"/>
+            </a:pPr>
+            <a:endParaRPr lang="en-US" dirty="0"/>
+          </a:p>
+          <a:p>
+            <a:pPr marL="342900" indent="-342900">
+              <a:buFont typeface="Arial" charset="0"/>
+              <a:buChar char="•"/>
+            </a:pPr>
+            <a:r>
+              <a:rPr lang="en-US" dirty="0"/>
+              <a:t>Checkout the code from </a:t>
+            </a:r>
+            <a:r>
+              <a:rPr lang="en-US" dirty="0" err="1"/>
+              <a:t>Github</a:t>
+            </a:r>
+            <a:endParaRPr lang="en-US" dirty="0"/>
+          </a:p>
+          <a:p>
+            <a:pPr marL="569913" lvl="1" indent="-342900">
+              <a:buFont typeface="Arial" charset="0"/>
+              <a:buChar char="•"/>
+            </a:pPr>
+            <a:r>
+              <a:rPr lang="en-US" sz="1800" dirty="0">
+                <a:hlinkClick r:id="rId3"/>
+              </a:rPr>
+              <a:t>https://github.com/couchbaselabs/aspnet-nosql-workshop/tree/master/03</a:t>
+            </a:r>
+            <a:endParaRPr lang="en-US" sz="1800" dirty="0"/>
+          </a:p>
+          <a:p>
+            <a:pPr marL="569913" lvl="1" indent="-342900">
+              <a:buFont typeface="Arial" charset="0"/>
+              <a:buChar char="•"/>
+            </a:pPr>
+            <a:endParaRPr lang="en-US" dirty="0"/>
+          </a:p>
+          <a:p>
+            <a:pPr marL="342900" indent="-342900">
+              <a:buFont typeface="Arial" charset="0"/>
+              <a:buChar char="•"/>
+            </a:pPr>
+            <a:r>
+              <a:rPr lang="en-US" dirty="0"/>
+              <a:t>The source code is also available on USB sticks</a:t>
+            </a:r>
+          </a:p>
+          <a:p>
+            <a:pPr marL="342900" indent="-342900">
+              <a:buFont typeface="Arial" charset="0"/>
+              <a:buChar char="•"/>
+            </a:pPr>
+            <a:endParaRPr lang="en-US" dirty="0"/>
+          </a:p>
+          <a:p>
+            <a:pPr marL="342900" indent="-342900">
+              <a:buFont typeface="Arial" charset="0"/>
+              <a:buChar char="•"/>
+            </a:pPr>
+            <a:r>
+              <a:rPr lang="en-US" dirty="0"/>
+              <a:t>You can test with Postman / Fiddler / curl</a:t>
+            </a:r>
+          </a:p>
+          <a:p>
+            <a:pPr marL="342900" indent="-342900">
+              <a:buFont typeface="Arial" charset="0"/>
+              <a:buChar char="•"/>
+            </a:pPr>
+            <a:endParaRPr lang="en-US" b="1" dirty="0"/>
+          </a:p>
+          <a:p>
+            <a:endParaRPr lang="en-US" dirty="0"/>
+          </a:p>
+        </p:txBody>
+      </p:sp>
+    </p:spTree>
+    <p:extLst>
+      <p:ext uri="{BB962C8B-B14F-4D97-AF65-F5344CB8AC3E}">
+        <p14:creationId xmlns:p14="http://schemas.microsoft.com/office/powerpoint/2010/main" val="3268682032"/>
+      </p:ext>
+    </p:extLst>
+  </p:cSld>
+  <p:clrMapOvr>
+    <a:masterClrMapping/>
+  </p:clrMapOvr>
+</p:sld>
+</file>
+
+<file path=ppt/slides/slide19.xml><?xml version="1.0" encoding="utf-8"?>
+<p:sld xmlns:a="http://schemas.openxmlformats.org/drawingml/2006/main" xmlns:r="http://schemas.openxmlformats.org/officeDocument/2006/relationships" xmlns:p="http://schemas.openxmlformats.org/presentationml/2006/main">
+  <p:cSld>
+    <p:spTree>
+      <p:nvGrpSpPr>
+        <p:cNvPr id="1" name=""/>
+        <p:cNvGrpSpPr/>
+        <p:nvPr/>
+      </p:nvGrpSpPr>
+      <p:grpSpPr>
+        <a:xfrm>
+          <a:off x="0" y="0"/>
+          <a:ext cx="0" cy="0"/>
+          <a:chOff x="0" y="0"/>
+          <a:chExt cx="0" cy="0"/>
+        </a:xfrm>
+      </p:grpSpPr>
+      <p:sp>
+        <p:nvSpPr>
+          <p:cNvPr id="2" name="Title 1"/>
+          <p:cNvSpPr>
+            <a:spLocks noGrp="1"/>
+          </p:cNvSpPr>
+          <p:nvPr>
+            <p:ph type="title"/>
+          </p:nvPr>
+        </p:nvSpPr>
+        <p:spPr/>
+        <p:txBody>
+          <a:bodyPr/>
+          <a:lstStyle/>
+          <a:p>
+            <a:r>
+              <a:rPr lang="en-US" dirty="0"/>
+              <a:t>ASP.NET</a:t>
+            </a:r>
+          </a:p>
+        </p:txBody>
+      </p:sp>
+      <p:sp>
+        <p:nvSpPr>
+          <p:cNvPr id="3" name="Content Placeholder 2"/>
+          <p:cNvSpPr>
+            <a:spLocks noGrp="1"/>
+          </p:cNvSpPr>
+          <p:nvPr>
+            <p:ph idx="1"/>
+          </p:nvPr>
+        </p:nvSpPr>
+        <p:spPr/>
+        <p:txBody>
+          <a:bodyPr/>
+          <a:lstStyle/>
+          <a:p>
+            <a:pPr marL="342900" indent="-342900">
+              <a:buFont typeface="Arial" panose="020B0604020202020204" pitchFamily="34" charset="0"/>
+              <a:buChar char="•"/>
+            </a:pPr>
+            <a:r>
+              <a:rPr lang="en-US" dirty="0" err="1"/>
+              <a:t>dotnet_workshop</a:t>
+            </a:r>
+            <a:endParaRPr lang="en-US" dirty="0"/>
+          </a:p>
+          <a:p>
+            <a:pPr marL="342900" indent="-342900">
+              <a:buFont typeface="Arial" panose="020B0604020202020204" pitchFamily="34" charset="0"/>
+              <a:buChar char="•"/>
+            </a:pPr>
+            <a:endParaRPr lang="en-US" dirty="0"/>
+          </a:p>
+          <a:p>
+            <a:pPr marL="342900" indent="-342900">
+              <a:buFont typeface="Arial" panose="020B0604020202020204" pitchFamily="34" charset="0"/>
+              <a:buChar char="•"/>
+            </a:pPr>
+            <a:r>
+              <a:rPr lang="en-US" dirty="0"/>
+              <a:t>Look for TODOs</a:t>
+            </a:r>
+          </a:p>
+          <a:p>
+            <a:pPr marL="342900" indent="-342900">
+              <a:buFont typeface="Arial" panose="020B0604020202020204" pitchFamily="34" charset="0"/>
+              <a:buChar char="•"/>
+            </a:pPr>
+            <a:endParaRPr lang="en-US" dirty="0"/>
+          </a:p>
+          <a:p>
+            <a:pPr marL="342900" indent="-342900">
+              <a:buFont typeface="Arial" panose="020B0604020202020204" pitchFamily="34" charset="0"/>
+              <a:buChar char="•"/>
+            </a:pPr>
+            <a:r>
+              <a:rPr lang="en-US" dirty="0"/>
+              <a:t>Files included:</a:t>
+            </a:r>
+          </a:p>
+          <a:p>
+            <a:pPr marL="573088" lvl="1" indent="-342900">
+              <a:buFont typeface="Arial" panose="020B0604020202020204" pitchFamily="34" charset="0"/>
+              <a:buChar char="•"/>
+            </a:pPr>
+            <a:r>
+              <a:rPr lang="en-US" dirty="0" err="1"/>
+              <a:t>CouchbaseConfig.cs</a:t>
+            </a:r>
+            <a:endParaRPr lang="en-US" dirty="0"/>
+          </a:p>
+          <a:p>
+            <a:pPr marL="573088" lvl="1" indent="-342900">
+              <a:buFont typeface="Arial" panose="020B0604020202020204" pitchFamily="34" charset="0"/>
+              <a:buChar char="•"/>
+            </a:pPr>
+            <a:r>
+              <a:rPr lang="en-US" dirty="0" err="1"/>
+              <a:t>PersonController.cs</a:t>
+            </a:r>
+            <a:endParaRPr lang="en-US" dirty="0"/>
+          </a:p>
+          <a:p>
+            <a:pPr marL="573088" lvl="1" indent="-342900">
+              <a:buFont typeface="Arial" panose="020B0604020202020204" pitchFamily="34" charset="0"/>
+              <a:buChar char="•"/>
+            </a:pPr>
+            <a:r>
+              <a:rPr lang="en-US" dirty="0" err="1"/>
+              <a:t>Web.config</a:t>
+            </a:r>
+            <a:endParaRPr lang="en-US" dirty="0"/>
+          </a:p>
+          <a:p>
+            <a:pPr marL="573088" lvl="1" indent="-342900">
+              <a:buFont typeface="Arial" panose="020B0604020202020204" pitchFamily="34" charset="0"/>
+              <a:buChar char="•"/>
+            </a:pPr>
+            <a:endParaRPr lang="en-US" dirty="0"/>
+          </a:p>
+          <a:p>
+            <a:pPr marL="342900" indent="-342900">
+              <a:buFont typeface="Arial" panose="020B0604020202020204" pitchFamily="34" charset="0"/>
+              <a:buChar char="•"/>
+            </a:pPr>
+            <a:endParaRPr lang="en-US" dirty="0"/>
+          </a:p>
+        </p:txBody>
+      </p:sp>
+    </p:spTree>
+    <p:extLst>
+      <p:ext uri="{BB962C8B-B14F-4D97-AF65-F5344CB8AC3E}">
+        <p14:creationId xmlns:p14="http://schemas.microsoft.com/office/powerpoint/2010/main" val="4024958778"/>
       </p:ext>
     </p:extLst>
   </p:cSld>
@@ -8376,6 +10689,369 @@
 </p:sld>
 </file>
 
+<file path=ppt/slides/slide20.xml><?xml version="1.0" encoding="utf-8"?>
+<p:sld xmlns:a="http://schemas.openxmlformats.org/drawingml/2006/main" xmlns:r="http://schemas.openxmlformats.org/officeDocument/2006/relationships" xmlns:p="http://schemas.openxmlformats.org/presentationml/2006/main">
+  <p:cSld>
+    <p:spTree>
+      <p:nvGrpSpPr>
+        <p:cNvPr id="1" name=""/>
+        <p:cNvGrpSpPr/>
+        <p:nvPr/>
+      </p:nvGrpSpPr>
+      <p:grpSpPr>
+        <a:xfrm>
+          <a:off x="0" y="0"/>
+          <a:ext cx="0" cy="0"/>
+          <a:chOff x="0" y="0"/>
+          <a:chExt cx="0" cy="0"/>
+        </a:xfrm>
+      </p:grpSpPr>
+      <p:sp>
+        <p:nvSpPr>
+          <p:cNvPr id="2" name="Title 1"/>
+          <p:cNvSpPr>
+            <a:spLocks noGrp="1"/>
+          </p:cNvSpPr>
+          <p:nvPr>
+            <p:ph type="title"/>
+          </p:nvPr>
+        </p:nvSpPr>
+        <p:spPr/>
+        <p:txBody>
+          <a:bodyPr/>
+          <a:lstStyle/>
+          <a:p>
+            <a:r>
+              <a:rPr lang="en-US" dirty="0"/>
+              <a:t>ASP.NET Core</a:t>
+            </a:r>
+          </a:p>
+        </p:txBody>
+      </p:sp>
+      <p:sp>
+        <p:nvSpPr>
+          <p:cNvPr id="3" name="Content Placeholder 2"/>
+          <p:cNvSpPr>
+            <a:spLocks noGrp="1"/>
+          </p:cNvSpPr>
+          <p:nvPr>
+            <p:ph idx="1"/>
+          </p:nvPr>
+        </p:nvSpPr>
+        <p:spPr/>
+        <p:txBody>
+          <a:bodyPr/>
+          <a:lstStyle/>
+          <a:p>
+            <a:pPr marL="342900" indent="-342900">
+              <a:buFont typeface="Arial" panose="020B0604020202020204" pitchFamily="34" charset="0"/>
+              <a:buChar char="•"/>
+            </a:pPr>
+            <a:r>
+              <a:rPr lang="en-US" dirty="0" err="1"/>
+              <a:t>dotnetcore_workshop</a:t>
+            </a:r>
+            <a:endParaRPr lang="en-US" dirty="0"/>
+          </a:p>
+          <a:p>
+            <a:pPr marL="342900" indent="-342900">
+              <a:buFont typeface="Arial" panose="020B0604020202020204" pitchFamily="34" charset="0"/>
+              <a:buChar char="•"/>
+            </a:pPr>
+            <a:endParaRPr lang="en-US" dirty="0"/>
+          </a:p>
+          <a:p>
+            <a:pPr marL="342900" indent="-342900">
+              <a:buFont typeface="Arial" panose="020B0604020202020204" pitchFamily="34" charset="0"/>
+              <a:buChar char="•"/>
+            </a:pPr>
+            <a:r>
+              <a:rPr lang="en-US" dirty="0"/>
+              <a:t>Look for TODOs</a:t>
+            </a:r>
+          </a:p>
+          <a:p>
+            <a:pPr marL="342900" indent="-342900">
+              <a:buFont typeface="Arial" panose="020B0604020202020204" pitchFamily="34" charset="0"/>
+              <a:buChar char="•"/>
+            </a:pPr>
+            <a:endParaRPr lang="en-US" dirty="0"/>
+          </a:p>
+          <a:p>
+            <a:pPr marL="342900" indent="-342900">
+              <a:buFont typeface="Arial" panose="020B0604020202020204" pitchFamily="34" charset="0"/>
+              <a:buChar char="•"/>
+            </a:pPr>
+            <a:r>
+              <a:rPr lang="en-US" dirty="0"/>
+              <a:t>Files included:</a:t>
+            </a:r>
+          </a:p>
+          <a:p>
+            <a:pPr marL="573088" lvl="1" indent="-342900">
+              <a:buFont typeface="Arial" panose="020B0604020202020204" pitchFamily="34" charset="0"/>
+              <a:buChar char="•"/>
+            </a:pPr>
+            <a:r>
+              <a:rPr lang="en-US" dirty="0" err="1"/>
+              <a:t>appsettings.json</a:t>
+            </a:r>
+            <a:endParaRPr lang="en-US" dirty="0"/>
+          </a:p>
+          <a:p>
+            <a:pPr marL="573088" lvl="1" indent="-342900">
+              <a:buFont typeface="Arial" panose="020B0604020202020204" pitchFamily="34" charset="0"/>
+              <a:buChar char="•"/>
+            </a:pPr>
+            <a:r>
+              <a:rPr lang="en-US" dirty="0" err="1"/>
+              <a:t>PersonController.cs</a:t>
+            </a:r>
+            <a:endParaRPr lang="en-US" dirty="0"/>
+          </a:p>
+          <a:p>
+            <a:pPr marL="573088" lvl="1" indent="-342900">
+              <a:buFont typeface="Arial" panose="020B0604020202020204" pitchFamily="34" charset="0"/>
+              <a:buChar char="•"/>
+            </a:pPr>
+            <a:r>
+              <a:rPr lang="en-US" dirty="0" err="1"/>
+              <a:t>Startup.cs</a:t>
+            </a:r>
+            <a:endParaRPr lang="en-US" dirty="0"/>
+          </a:p>
+          <a:p>
+            <a:pPr marL="573088" lvl="1" indent="-342900">
+              <a:buFont typeface="Arial" panose="020B0604020202020204" pitchFamily="34" charset="0"/>
+              <a:buChar char="•"/>
+            </a:pPr>
+            <a:endParaRPr lang="en-US" dirty="0"/>
+          </a:p>
+          <a:p>
+            <a:pPr marL="573088" lvl="1" indent="-342900">
+              <a:buFont typeface="Arial" panose="020B0604020202020204" pitchFamily="34" charset="0"/>
+              <a:buChar char="•"/>
+            </a:pPr>
+            <a:endParaRPr lang="en-US" dirty="0"/>
+          </a:p>
+          <a:p>
+            <a:pPr marL="342900" indent="-342900">
+              <a:buFont typeface="Arial" panose="020B0604020202020204" pitchFamily="34" charset="0"/>
+              <a:buChar char="•"/>
+            </a:pPr>
+            <a:endParaRPr lang="en-US" dirty="0"/>
+          </a:p>
+        </p:txBody>
+      </p:sp>
+    </p:spTree>
+    <p:extLst>
+      <p:ext uri="{BB962C8B-B14F-4D97-AF65-F5344CB8AC3E}">
+        <p14:creationId xmlns:p14="http://schemas.microsoft.com/office/powerpoint/2010/main" val="2793661999"/>
+      </p:ext>
+    </p:extLst>
+  </p:cSld>
+  <p:clrMapOvr>
+    <a:masterClrMapping/>
+  </p:clrMapOvr>
+</p:sld>
+</file>
+
+<file path=ppt/slides/slide21.xml><?xml version="1.0" encoding="utf-8"?>
+<p:sld xmlns:a="http://schemas.openxmlformats.org/drawingml/2006/main" xmlns:r="http://schemas.openxmlformats.org/officeDocument/2006/relationships" xmlns:p="http://schemas.openxmlformats.org/presentationml/2006/main">
+  <p:cSld>
+    <p:spTree>
+      <p:nvGrpSpPr>
+        <p:cNvPr id="1" name=""/>
+        <p:cNvGrpSpPr/>
+        <p:nvPr/>
+      </p:nvGrpSpPr>
+      <p:grpSpPr>
+        <a:xfrm>
+          <a:off x="0" y="0"/>
+          <a:ext cx="0" cy="0"/>
+          <a:chOff x="0" y="0"/>
+          <a:chExt cx="0" cy="0"/>
+        </a:xfrm>
+      </p:grpSpPr>
+      <p:sp>
+        <p:nvSpPr>
+          <p:cNvPr id="2" name="Title 1"/>
+          <p:cNvSpPr>
+            <a:spLocks noGrp="1"/>
+          </p:cNvSpPr>
+          <p:nvPr>
+            <p:ph type="title"/>
+          </p:nvPr>
+        </p:nvSpPr>
+        <p:spPr/>
+        <p:txBody>
+          <a:bodyPr/>
+          <a:lstStyle/>
+          <a:p>
+            <a:r>
+              <a:rPr lang="en-US" dirty="0"/>
+              <a:t>How to execute</a:t>
+            </a:r>
+          </a:p>
+        </p:txBody>
+      </p:sp>
+      <p:sp>
+        <p:nvSpPr>
+          <p:cNvPr id="3" name="Content Placeholder 2"/>
+          <p:cNvSpPr>
+            <a:spLocks noGrp="1"/>
+          </p:cNvSpPr>
+          <p:nvPr>
+            <p:ph idx="1"/>
+          </p:nvPr>
+        </p:nvSpPr>
+        <p:spPr/>
+        <p:txBody>
+          <a:bodyPr/>
+          <a:lstStyle/>
+          <a:p>
+            <a:r>
+              <a:rPr lang="en-US" dirty="0"/>
+              <a:t>Execute RESTful API backend:</a:t>
+            </a:r>
+          </a:p>
+          <a:p>
+            <a:endParaRPr lang="en-US" dirty="0"/>
+          </a:p>
+          <a:p>
+            <a:pPr marL="342900" indent="-342900">
+              <a:buFont typeface="Arial" panose="020B0604020202020204" pitchFamily="34" charset="0"/>
+              <a:buChar char="•"/>
+            </a:pPr>
+            <a:r>
+              <a:rPr lang="en-US" dirty="0"/>
+              <a:t>Visual Studio: F5 (or ctrl+f5)</a:t>
+            </a:r>
+          </a:p>
+          <a:p>
+            <a:pPr marL="342900" indent="-342900">
+              <a:buFont typeface="Arial" panose="020B0604020202020204" pitchFamily="34" charset="0"/>
+              <a:buChar char="•"/>
+            </a:pPr>
+            <a:r>
+              <a:rPr lang="en-US" dirty="0" err="1">
+                <a:latin typeface="Consolas" panose="020B0609020204030204" pitchFamily="49" charset="0"/>
+              </a:rPr>
+              <a:t>dotnet</a:t>
+            </a:r>
+            <a:r>
+              <a:rPr lang="en-US" dirty="0">
+                <a:latin typeface="Consolas" panose="020B0609020204030204" pitchFamily="49" charset="0"/>
+              </a:rPr>
+              <a:t> run</a:t>
+            </a:r>
+            <a:r>
+              <a:rPr lang="en-US" dirty="0"/>
+              <a:t> from command line</a:t>
+            </a:r>
+          </a:p>
+        </p:txBody>
+      </p:sp>
+    </p:spTree>
+    <p:extLst>
+      <p:ext uri="{BB962C8B-B14F-4D97-AF65-F5344CB8AC3E}">
+        <p14:creationId xmlns:p14="http://schemas.microsoft.com/office/powerpoint/2010/main" val="576445989"/>
+      </p:ext>
+    </p:extLst>
+  </p:cSld>
+  <p:clrMapOvr>
+    <a:masterClrMapping/>
+  </p:clrMapOvr>
+</p:sld>
+</file>
+
+<file path=ppt/slides/slide22.xml><?xml version="1.0" encoding="utf-8"?>
+<p:sld xmlns:a="http://schemas.openxmlformats.org/drawingml/2006/main" xmlns:r="http://schemas.openxmlformats.org/officeDocument/2006/relationships" xmlns:p="http://schemas.openxmlformats.org/presentationml/2006/main">
+  <p:cSld>
+    <p:spTree>
+      <p:nvGrpSpPr>
+        <p:cNvPr id="1" name=""/>
+        <p:cNvGrpSpPr/>
+        <p:nvPr/>
+      </p:nvGrpSpPr>
+      <p:grpSpPr>
+        <a:xfrm>
+          <a:off x="0" y="0"/>
+          <a:ext cx="0" cy="0"/>
+          <a:chOff x="0" y="0"/>
+          <a:chExt cx="0" cy="0"/>
+        </a:xfrm>
+      </p:grpSpPr>
+      <p:sp>
+        <p:nvSpPr>
+          <p:cNvPr id="2" name="Title 1"/>
+          <p:cNvSpPr>
+            <a:spLocks noGrp="1"/>
+          </p:cNvSpPr>
+          <p:nvPr>
+            <p:ph type="title"/>
+          </p:nvPr>
+        </p:nvSpPr>
+        <p:spPr/>
+        <p:txBody>
+          <a:bodyPr/>
+          <a:lstStyle/>
+          <a:p>
+            <a:r>
+              <a:rPr lang="en-US" dirty="0"/>
+              <a:t>Exercise: Getting Started</a:t>
+            </a:r>
+          </a:p>
+        </p:txBody>
+      </p:sp>
+      <p:sp>
+        <p:nvSpPr>
+          <p:cNvPr id="3" name="Content Placeholder 2"/>
+          <p:cNvSpPr>
+            <a:spLocks noGrp="1"/>
+          </p:cNvSpPr>
+          <p:nvPr>
+            <p:ph idx="1"/>
+          </p:nvPr>
+        </p:nvSpPr>
+        <p:spPr/>
+        <p:txBody>
+          <a:bodyPr/>
+          <a:lstStyle/>
+          <a:p>
+            <a:r>
+              <a:rPr lang="en-US" b="1" dirty="0"/>
+              <a:t>At the end of the lab, your app should be able to </a:t>
+            </a:r>
+            <a:r>
+              <a:rPr lang="en-US" b="1" u="sng" dirty="0"/>
+              <a:t>list, add, edit, and delete.</a:t>
+            </a:r>
+          </a:p>
+          <a:p>
+            <a:endParaRPr lang="en-US" dirty="0"/>
+          </a:p>
+          <a:p>
+            <a:r>
+              <a:rPr lang="en-US" dirty="0"/>
+              <a:t>If you have questions or are running into a problem, I'll be walking around helping you individually.</a:t>
+            </a:r>
+          </a:p>
+        </p:txBody>
+      </p:sp>
+    </p:spTree>
+    <p:extLst>
+      <p:ext uri="{BB962C8B-B14F-4D97-AF65-F5344CB8AC3E}">
+        <p14:creationId xmlns:p14="http://schemas.microsoft.com/office/powerpoint/2010/main" val="1980548735"/>
+      </p:ext>
+    </p:extLst>
+  </p:cSld>
+  <p:clrMapOvr>
+    <a:masterClrMapping/>
+  </p:clrMapOvr>
+</p:sld>
+</file>
+
 <file path=ppt/slides/slide3.xml><?xml version="1.0" encoding="utf-8"?>
 <p:sld xmlns:a="http://schemas.openxmlformats.org/drawingml/2006/main" xmlns:r="http://schemas.openxmlformats.org/officeDocument/2006/relationships" xmlns:p="http://schemas.openxmlformats.org/presentationml/2006/main">
   <p:cSld>
@@ -8445,10 +11121,17 @@
             <a:endParaRPr lang="en-US" dirty="0"/>
           </a:p>
           <a:p>
-            <a:pPr marL="573088" lvl="1" indent="-342900">
+            <a:pPr marL="342900" indent="-342900">
               <a:buFont typeface="Arial" charset="0"/>
               <a:buChar char="•"/>
             </a:pPr>
+            <a:endParaRPr lang="en-US" dirty="0"/>
+          </a:p>
+          <a:p>
+            <a:pPr marL="342900" indent="-342900">
+              <a:buFont typeface="Arial" charset="0"/>
+              <a:buChar char="•"/>
+            </a:pPr>
             <a:r>
               <a:rPr lang="en-US" dirty="0"/>
               <a:t>Or .NET Core – ASP.NET Core </a:t>
@@ -8457,6 +11140,13 @@
               <a:rPr lang="en-US" dirty="0" err="1"/>
               <a:t>WebAPI</a:t>
             </a:r>
+            <a:endParaRPr lang="en-US" dirty="0"/>
+          </a:p>
+          <a:p>
+            <a:pPr marL="342900" indent="-342900">
+              <a:buFont typeface="Arial" charset="0"/>
+              <a:buChar char="•"/>
+            </a:pPr>
             <a:endParaRPr lang="en-US" dirty="0"/>
           </a:p>
           <a:p>
@@ -8564,7 +11254,7 @@
           <a:p>
             <a:r>
               <a:rPr lang="en-US" dirty="0"/>
-              <a:t>Exercise: Fill in the blanks</a:t>
+              <a:t>ASP.NET</a:t>
             </a:r>
           </a:p>
         </p:txBody>
@@ -8572,286 +11262,81 @@
       <p:sp>
         <p:nvSpPr>
           <p:cNvPr id="3" name="Content Placeholder 2"/>
-          <p:cNvSpPr txBox="1">
-            <a:spLocks/>
-          </p:cNvSpPr>
-          <p:nvPr/>
-        </p:nvSpPr>
-        <p:spPr>
-          <a:xfrm>
-            <a:off x="198157" y="838200"/>
-            <a:ext cx="8802967" cy="3394472"/>
-          </a:xfrm>
-          <a:prstGeom prst="rect">
-            <a:avLst/>
-          </a:prstGeom>
-        </p:spPr>
+          <p:cNvSpPr>
+            <a:spLocks noGrp="1"/>
+          </p:cNvSpPr>
+          <p:nvPr>
+            <p:ph idx="1"/>
+          </p:nvPr>
+        </p:nvSpPr>
+        <p:spPr/>
         <p:txBody>
           <a:bodyPr/>
-          <a:lstStyle>
-            <a:lvl1pPr marL="228600" indent="-228600" algn="l" defTabSz="457200" rtl="0" eaLnBrk="1" latinLnBrk="0" hangingPunct="1">
-              <a:spcBef>
-                <a:spcPts val="0"/>
-              </a:spcBef>
-              <a:buClr>
-                <a:schemeClr val="accent1"/>
-              </a:buClr>
-              <a:buFont typeface="Wingdings" charset="2"/>
-              <a:buChar char="§"/>
-              <a:defRPr sz="2400" kern="1200">
-                <a:solidFill>
-                  <a:schemeClr val="tx1"/>
-                </a:solidFill>
-                <a:latin typeface="+mn-lt"/>
-                <a:ea typeface="+mn-ea"/>
-                <a:cs typeface="+mn-cs"/>
-              </a:defRPr>
-            </a:lvl1pPr>
-            <a:lvl2pPr marL="455613" indent="-227013" algn="l" defTabSz="457200" rtl="0" eaLnBrk="1" latinLnBrk="0" hangingPunct="1">
-              <a:spcBef>
-                <a:spcPts val="0"/>
-              </a:spcBef>
-              <a:buClr>
-                <a:srgbClr val="262626"/>
-              </a:buClr>
-              <a:buFont typeface="Wingdings" charset="2"/>
-              <a:buChar char="§"/>
-              <a:defRPr sz="2000" kern="1200">
-                <a:solidFill>
-                  <a:schemeClr val="tx1"/>
-                </a:solidFill>
-                <a:latin typeface="+mn-lt"/>
-                <a:ea typeface="+mn-ea"/>
-                <a:cs typeface="+mn-cs"/>
-              </a:defRPr>
-            </a:lvl2pPr>
-            <a:lvl3pPr marL="455613" indent="-228600" algn="l" defTabSz="457200" rtl="0" eaLnBrk="1" latinLnBrk="0" hangingPunct="1">
-              <a:spcBef>
-                <a:spcPts val="0"/>
-              </a:spcBef>
-              <a:buClr>
-                <a:srgbClr val="262626"/>
-              </a:buClr>
-              <a:buFont typeface="Wingdings" charset="2"/>
-              <a:buChar char="§"/>
-              <a:defRPr sz="2000" kern="1200">
-                <a:solidFill>
-                  <a:schemeClr val="tx1"/>
-                </a:solidFill>
-                <a:latin typeface="+mn-lt"/>
-                <a:ea typeface="+mn-ea"/>
-                <a:cs typeface="+mn-cs"/>
-              </a:defRPr>
-            </a:lvl3pPr>
-            <a:lvl4pPr marL="455613" indent="-228600" algn="l" defTabSz="457200" rtl="0" eaLnBrk="1" latinLnBrk="0" hangingPunct="1">
-              <a:spcBef>
-                <a:spcPts val="0"/>
-              </a:spcBef>
-              <a:buClr>
-                <a:srgbClr val="262626"/>
-              </a:buClr>
-              <a:buFont typeface="Wingdings" charset="2"/>
-              <a:buChar char="§"/>
-              <a:defRPr sz="2000" kern="1200">
-                <a:solidFill>
-                  <a:schemeClr val="tx1"/>
-                </a:solidFill>
-                <a:latin typeface="+mn-lt"/>
-                <a:ea typeface="+mn-ea"/>
-                <a:cs typeface="+mn-cs"/>
-              </a:defRPr>
-            </a:lvl4pPr>
-            <a:lvl5pPr marL="455613" indent="-228600" algn="l" defTabSz="457200" rtl="0" eaLnBrk="1" latinLnBrk="0" hangingPunct="1">
-              <a:spcBef>
-                <a:spcPts val="200"/>
-              </a:spcBef>
-              <a:buClr>
-                <a:srgbClr val="262626"/>
-              </a:buClr>
-              <a:buFont typeface="Wingdings" charset="2"/>
-              <a:buChar char="§"/>
-              <a:defRPr sz="2000" kern="1200">
-                <a:solidFill>
-                  <a:schemeClr val="tx1"/>
-                </a:solidFill>
-                <a:latin typeface="+mn-lt"/>
-                <a:ea typeface="+mn-ea"/>
-                <a:cs typeface="+mn-cs"/>
-              </a:defRPr>
-            </a:lvl5pPr>
-            <a:lvl6pPr marL="2514600" indent="-228600" algn="l" defTabSz="457200" rtl="0" eaLnBrk="1" latinLnBrk="0" hangingPunct="1">
-              <a:spcBef>
-                <a:spcPct val="20000"/>
-              </a:spcBef>
-              <a:buFont typeface="Arial"/>
-              <a:buChar char="•"/>
-              <a:defRPr sz="2000" kern="1200">
-                <a:solidFill>
-                  <a:schemeClr val="tx1"/>
-                </a:solidFill>
-                <a:latin typeface="+mn-lt"/>
-                <a:ea typeface="+mn-ea"/>
-                <a:cs typeface="+mn-cs"/>
-              </a:defRPr>
-            </a:lvl6pPr>
-            <a:lvl7pPr marL="2971800" indent="-228600" algn="l" defTabSz="457200" rtl="0" eaLnBrk="1" latinLnBrk="0" hangingPunct="1">
-              <a:spcBef>
-                <a:spcPct val="20000"/>
-              </a:spcBef>
-              <a:buFont typeface="Arial"/>
-              <a:buChar char="•"/>
-              <a:defRPr sz="2000" kern="1200">
-                <a:solidFill>
-                  <a:schemeClr val="tx1"/>
-                </a:solidFill>
-                <a:latin typeface="+mn-lt"/>
-                <a:ea typeface="+mn-ea"/>
-                <a:cs typeface="+mn-cs"/>
-              </a:defRPr>
-            </a:lvl7pPr>
-            <a:lvl8pPr marL="3429000" indent="-228600" algn="l" defTabSz="457200" rtl="0" eaLnBrk="1" latinLnBrk="0" hangingPunct="1">
-              <a:spcBef>
-                <a:spcPct val="20000"/>
-              </a:spcBef>
-              <a:buFont typeface="Arial"/>
-              <a:buChar char="•"/>
-              <a:defRPr sz="2000" kern="1200">
-                <a:solidFill>
-                  <a:schemeClr val="tx1"/>
-                </a:solidFill>
-                <a:latin typeface="+mn-lt"/>
-                <a:ea typeface="+mn-ea"/>
-                <a:cs typeface="+mn-cs"/>
-              </a:defRPr>
-            </a:lvl8pPr>
-            <a:lvl9pPr marL="3886200" indent="-228600" algn="l" defTabSz="457200" rtl="0" eaLnBrk="1" latinLnBrk="0" hangingPunct="1">
-              <a:spcBef>
-                <a:spcPct val="20000"/>
-              </a:spcBef>
-              <a:buFont typeface="Arial"/>
-              <a:buChar char="•"/>
-              <a:defRPr sz="2000" kern="1200">
-                <a:solidFill>
-                  <a:schemeClr val="tx1"/>
-                </a:solidFill>
-                <a:latin typeface="+mn-lt"/>
-                <a:ea typeface="+mn-ea"/>
-                <a:cs typeface="+mn-cs"/>
-              </a:defRPr>
-            </a:lvl9pPr>
-          </a:lstStyle>
+          <a:lstStyle/>
           <a:p>
             <a:pPr marL="342900" indent="-342900">
-              <a:buFont typeface="Arial" charset="0"/>
+              <a:buFont typeface="Arial" panose="020B0604020202020204" pitchFamily="34" charset="0"/>
               <a:buChar char="•"/>
             </a:pPr>
             <a:r>
               <a:rPr lang="en-US" dirty="0"/>
-              <a:t>Fill in the blanks to make the application work</a:t>
-            </a:r>
-          </a:p>
-          <a:p>
-            <a:pPr marL="569913" lvl="1" indent="-342900">
-              <a:buFont typeface="Arial" charset="0"/>
-              <a:buChar char="•"/>
-            </a:pPr>
-            <a:r>
-              <a:rPr lang="en-US" dirty="0" err="1"/>
-              <a:t>dotnet_workshop</a:t>
-            </a:r>
-            <a:r>
-              <a:rPr lang="en-US" dirty="0"/>
-              <a:t> or </a:t>
-            </a:r>
-            <a:r>
-              <a:rPr lang="en-US" dirty="0" err="1"/>
-              <a:t>dotnetcore_workshop</a:t>
-            </a:r>
-            <a:endParaRPr lang="en-US" dirty="0"/>
-          </a:p>
-          <a:p>
-            <a:pPr marL="569913" lvl="1" indent="-342900">
-              <a:buFont typeface="Arial" charset="0"/>
-              <a:buChar char="•"/>
-            </a:pPr>
-            <a:r>
-              <a:rPr lang="en-US" dirty="0"/>
-              <a:t>Completed versions are in </a:t>
-            </a:r>
-            <a:r>
-              <a:rPr lang="en-US" dirty="0" err="1"/>
-              <a:t>dotnet</a:t>
-            </a:r>
-            <a:r>
-              <a:rPr lang="en-US" dirty="0"/>
-              <a:t>, </a:t>
-            </a:r>
-            <a:r>
-              <a:rPr lang="en-US" dirty="0" err="1"/>
-              <a:t>dotnetcore</a:t>
-            </a:r>
-            <a:endParaRPr lang="en-US" dirty="0"/>
+              <a:t>Relies on IIS</a:t>
+            </a:r>
           </a:p>
           <a:p>
             <a:pPr marL="342900" indent="-342900">
-              <a:buFont typeface="Arial" charset="0"/>
+              <a:buFont typeface="Arial" panose="020B0604020202020204" pitchFamily="34" charset="0"/>
               <a:buChar char="•"/>
             </a:pPr>
             <a:endParaRPr lang="en-US" dirty="0"/>
           </a:p>
           <a:p>
             <a:pPr marL="342900" indent="-342900">
-              <a:buFont typeface="Arial" charset="0"/>
+              <a:buFont typeface="Arial" panose="020B0604020202020204" pitchFamily="34" charset="0"/>
               <a:buChar char="•"/>
             </a:pPr>
             <a:r>
               <a:rPr lang="en-US" dirty="0"/>
-              <a:t>Checkout the code from </a:t>
-            </a:r>
-            <a:r>
-              <a:rPr lang="en-US" dirty="0" err="1"/>
-              <a:t>Github</a:t>
-            </a:r>
-            <a:endParaRPr lang="en-US" dirty="0"/>
-          </a:p>
-          <a:p>
-            <a:pPr marL="569913" lvl="1" indent="-342900">
-              <a:buFont typeface="Arial" charset="0"/>
-              <a:buChar char="•"/>
-            </a:pPr>
-            <a:r>
-              <a:rPr lang="en-US" sz="1800" dirty="0">
-                <a:hlinkClick r:id="rId2"/>
-              </a:rPr>
-              <a:t>https://github.com/couchbaselabs/aspnet-nosql-workshop/tree/master/03</a:t>
-            </a:r>
-            <a:endParaRPr lang="en-US" sz="1800" dirty="0"/>
-          </a:p>
-          <a:p>
-            <a:pPr marL="569913" lvl="1" indent="-342900">
-              <a:buFont typeface="Arial" charset="0"/>
+              <a:t>Controllers contain methods</a:t>
+            </a:r>
+          </a:p>
+          <a:p>
+            <a:pPr marL="342900" indent="-342900">
+              <a:buFont typeface="Arial" panose="020B0604020202020204" pitchFamily="34" charset="0"/>
               <a:buChar char="•"/>
             </a:pPr>
             <a:endParaRPr lang="en-US" dirty="0"/>
           </a:p>
           <a:p>
             <a:pPr marL="342900" indent="-342900">
-              <a:buFont typeface="Arial" charset="0"/>
+              <a:buFont typeface="Arial" panose="020B0604020202020204" pitchFamily="34" charset="0"/>
               <a:buChar char="•"/>
             </a:pPr>
             <a:r>
-              <a:rPr lang="en-US" dirty="0"/>
-              <a:t>The source code is also available on USB sticks</a:t>
-            </a:r>
+              <a:rPr lang="en-US" dirty="0" err="1"/>
+              <a:t>Global.asax.cs</a:t>
+            </a:r>
+            <a:endParaRPr lang="en-US" dirty="0"/>
           </a:p>
           <a:p>
             <a:pPr marL="342900" indent="-342900">
-              <a:buFont typeface="Arial" charset="0"/>
+              <a:buFont typeface="Arial" panose="020B0604020202020204" pitchFamily="34" charset="0"/>
               <a:buChar char="•"/>
             </a:pPr>
-            <a:endParaRPr lang="en-US" b="1" dirty="0"/>
-          </a:p>
-          <a:p>
+            <a:endParaRPr lang="en-US" dirty="0"/>
+          </a:p>
+          <a:p>
+            <a:pPr marL="573088" lvl="1" indent="-342900">
+              <a:buFont typeface="Arial" panose="020B0604020202020204" pitchFamily="34" charset="0"/>
+              <a:buChar char="•"/>
+            </a:pPr>
+            <a:endParaRPr lang="en-US" dirty="0"/>
+          </a:p>
+          <a:p>
+            <a:pPr marL="342900" indent="-342900">
+              <a:buFont typeface="Arial" panose="020B0604020202020204" pitchFamily="34" charset="0"/>
+              <a:buChar char="•"/>
+            </a:pPr>
             <a:endParaRPr lang="en-US" dirty="0"/>
           </a:p>
         </p:txBody>
@@ -8859,7 +11344,7 @@
     </p:spTree>
     <p:extLst>
       <p:ext uri="{BB962C8B-B14F-4D97-AF65-F5344CB8AC3E}">
-        <p14:creationId xmlns:p14="http://schemas.microsoft.com/office/powerpoint/2010/main" val="4131121896"/>
+        <p14:creationId xmlns:p14="http://schemas.microsoft.com/office/powerpoint/2010/main" val="4291799914"/>
       </p:ext>
     </p:extLst>
   </p:cSld>
@@ -8903,7 +11388,7 @@
           <a:p>
             <a:r>
               <a:rPr lang="en-US" dirty="0"/>
-              <a:t>Exercise: Getting Started</a:t>
+              <a:t>ASP.NET Core</a:t>
             </a:r>
           </a:p>
         </p:txBody>
@@ -8923,140 +11408,14 @@
           <a:bodyPr/>
           <a:lstStyle/>
           <a:p>
-            <a:r>
-              <a:rPr lang="en-US" dirty="0"/>
-              <a:t>We’re going to fill in one of the blanks together, one for each language/platform.</a:t>
-            </a:r>
-          </a:p>
-          <a:p>
-            <a:endParaRPr lang="en-US" dirty="0"/>
-          </a:p>
-          <a:p>
-            <a:r>
-              <a:rPr lang="en-US" dirty="0"/>
-              <a:t>The rest of the them are up to you.</a:t>
-            </a:r>
-          </a:p>
-          <a:p>
-            <a:endParaRPr lang="en-US" dirty="0"/>
-          </a:p>
-          <a:p>
-            <a:r>
-              <a:rPr lang="en-US" b="1" dirty="0"/>
-              <a:t>At the end of the lab, your app should be able to </a:t>
-            </a:r>
-            <a:r>
-              <a:rPr lang="en-US" b="1" u="sng" dirty="0"/>
-              <a:t>list, add, edit, and delete.</a:t>
-            </a:r>
-          </a:p>
-          <a:p>
-            <a:endParaRPr lang="en-US" dirty="0"/>
-          </a:p>
-          <a:p>
-            <a:r>
-              <a:rPr lang="en-US" dirty="0"/>
-              <a:t>If you have questions or are running into a problem, we’ll be walking around helping you individually.</a:t>
-            </a:r>
-          </a:p>
-        </p:txBody>
-      </p:sp>
-    </p:spTree>
-    <p:extLst>
-      <p:ext uri="{BB962C8B-B14F-4D97-AF65-F5344CB8AC3E}">
-        <p14:creationId xmlns:p14="http://schemas.microsoft.com/office/powerpoint/2010/main" val="3024447773"/>
-      </p:ext>
-    </p:extLst>
-  </p:cSld>
-  <p:clrMapOvr>
-    <a:masterClrMapping/>
-  </p:clrMapOvr>
-</p:sld>
-</file>
-
-<file path=ppt/slides/slide6.xml><?xml version="1.0" encoding="utf-8"?>
-<p:sld xmlns:a="http://schemas.openxmlformats.org/drawingml/2006/main" xmlns:r="http://schemas.openxmlformats.org/officeDocument/2006/relationships" xmlns:p="http://schemas.openxmlformats.org/presentationml/2006/main">
-  <p:cSld>
-    <p:spTree>
-      <p:nvGrpSpPr>
-        <p:cNvPr id="1" name=""/>
-        <p:cNvGrpSpPr/>
-        <p:nvPr/>
-      </p:nvGrpSpPr>
-      <p:grpSpPr>
-        <a:xfrm>
-          <a:off x="0" y="0"/>
-          <a:ext cx="0" cy="0"/>
-          <a:chOff x="0" y="0"/>
-          <a:chExt cx="0" cy="0"/>
-        </a:xfrm>
-      </p:grpSpPr>
-      <p:sp>
-        <p:nvSpPr>
-          <p:cNvPr id="2" name="Title 1"/>
-          <p:cNvSpPr>
-            <a:spLocks noGrp="1"/>
-          </p:cNvSpPr>
-          <p:nvPr>
-            <p:ph type="title"/>
-          </p:nvPr>
-        </p:nvSpPr>
-        <p:spPr/>
-        <p:txBody>
-          <a:bodyPr/>
-          <a:lstStyle/>
-          <a:p>
-            <a:r>
-              <a:rPr lang="en-US" dirty="0"/>
-              <a:t>ASP.NET</a:t>
-            </a:r>
-          </a:p>
-        </p:txBody>
-      </p:sp>
-      <p:sp>
-        <p:nvSpPr>
-          <p:cNvPr id="3" name="Content Placeholder 2"/>
-          <p:cNvSpPr>
-            <a:spLocks noGrp="1"/>
-          </p:cNvSpPr>
-          <p:nvPr>
-            <p:ph idx="1"/>
-          </p:nvPr>
-        </p:nvSpPr>
-        <p:spPr/>
-        <p:txBody>
-          <a:bodyPr/>
-          <a:lstStyle/>
-          <a:p>
             <a:pPr marL="342900" indent="-342900">
               <a:buFont typeface="Arial" panose="020B0604020202020204" pitchFamily="34" charset="0"/>
               <a:buChar char="•"/>
             </a:pPr>
             <a:r>
               <a:rPr lang="en-US" dirty="0"/>
-              <a:t>Relies on IIS</a:t>
-            </a:r>
-          </a:p>
-          <a:p>
-            <a:pPr marL="342900" indent="-342900">
-              <a:buFont typeface="Arial" panose="020B0604020202020204" pitchFamily="34" charset="0"/>
-              <a:buChar char="•"/>
-            </a:pPr>
-            <a:r>
-              <a:rPr lang="en-US" dirty="0"/>
-              <a:t>Controllers contain methods</a:t>
-            </a:r>
-          </a:p>
-          <a:p>
-            <a:pPr marL="342900" indent="-342900">
-              <a:buFont typeface="Arial" panose="020B0604020202020204" pitchFamily="34" charset="0"/>
-              <a:buChar char="•"/>
-            </a:pPr>
-            <a:r>
-              <a:rPr lang="en-US" dirty="0" err="1"/>
-              <a:t>Global.asax.cs</a:t>
-            </a:r>
-            <a:endParaRPr lang="en-US" dirty="0"/>
+              <a:t>Runs as a "command line" app, uses Kestrel server</a:t>
+            </a:r>
           </a:p>
           <a:p>
             <a:pPr marL="342900" indent="-342900">
@@ -9066,11 +11425,14 @@
             <a:endParaRPr lang="en-US" dirty="0"/>
           </a:p>
           <a:p>
-            <a:pPr marL="573088" lvl="1" indent="-342900">
+            <a:pPr marL="342900" indent="-342900">
               <a:buFont typeface="Arial" panose="020B0604020202020204" pitchFamily="34" charset="0"/>
               <a:buChar char="•"/>
             </a:pPr>
-            <a:endParaRPr lang="en-US" dirty="0"/>
+            <a:r>
+              <a:rPr lang="en-US" dirty="0"/>
+              <a:t>Controllers contain methods</a:t>
+            </a:r>
           </a:p>
           <a:p>
             <a:pPr marL="342900" indent="-342900">
@@ -9078,94 +11440,6 @@
               <a:buChar char="•"/>
             </a:pPr>
             <a:endParaRPr lang="en-US" dirty="0"/>
-          </a:p>
-        </p:txBody>
-      </p:sp>
-    </p:spTree>
-    <p:extLst>
-      <p:ext uri="{BB962C8B-B14F-4D97-AF65-F5344CB8AC3E}">
-        <p14:creationId xmlns:p14="http://schemas.microsoft.com/office/powerpoint/2010/main" val="4291799914"/>
-      </p:ext>
-    </p:extLst>
-  </p:cSld>
-  <p:clrMapOvr>
-    <a:masterClrMapping/>
-  </p:clrMapOvr>
-</p:sld>
-</file>
-
-<file path=ppt/slides/slide7.xml><?xml version="1.0" encoding="utf-8"?>
-<p:sld xmlns:a="http://schemas.openxmlformats.org/drawingml/2006/main" xmlns:r="http://schemas.openxmlformats.org/officeDocument/2006/relationships" xmlns:p="http://schemas.openxmlformats.org/presentationml/2006/main">
-  <p:cSld>
-    <p:spTree>
-      <p:nvGrpSpPr>
-        <p:cNvPr id="1" name=""/>
-        <p:cNvGrpSpPr/>
-        <p:nvPr/>
-      </p:nvGrpSpPr>
-      <p:grpSpPr>
-        <a:xfrm>
-          <a:off x="0" y="0"/>
-          <a:ext cx="0" cy="0"/>
-          <a:chOff x="0" y="0"/>
-          <a:chExt cx="0" cy="0"/>
-        </a:xfrm>
-      </p:grpSpPr>
-      <p:sp>
-        <p:nvSpPr>
-          <p:cNvPr id="2" name="Title 1"/>
-          <p:cNvSpPr>
-            <a:spLocks noGrp="1"/>
-          </p:cNvSpPr>
-          <p:nvPr>
-            <p:ph type="title"/>
-          </p:nvPr>
-        </p:nvSpPr>
-        <p:spPr/>
-        <p:txBody>
-          <a:bodyPr/>
-          <a:lstStyle/>
-          <a:p>
-            <a:r>
-              <a:rPr lang="en-US" dirty="0"/>
-              <a:t>ASP.NET Core</a:t>
-            </a:r>
-          </a:p>
-        </p:txBody>
-      </p:sp>
-      <p:sp>
-        <p:nvSpPr>
-          <p:cNvPr id="3" name="Content Placeholder 2"/>
-          <p:cNvSpPr>
-            <a:spLocks noGrp="1"/>
-          </p:cNvSpPr>
-          <p:nvPr>
-            <p:ph idx="1"/>
-          </p:nvPr>
-        </p:nvSpPr>
-        <p:spPr/>
-        <p:txBody>
-          <a:bodyPr/>
-          <a:lstStyle/>
-          <a:p>
-            <a:pPr marL="342900" indent="-342900">
-              <a:buFont typeface="Arial" panose="020B0604020202020204" pitchFamily="34" charset="0"/>
-              <a:buChar char="•"/>
-            </a:pPr>
-            <a:r>
-              <a:rPr lang="en-US" dirty="0"/>
-              <a:t>Runs as a "command line" app, uses Kestrel server</a:t>
-            </a:r>
-          </a:p>
-          <a:p>
-            <a:pPr marL="342900" indent="-342900">
-              <a:buFont typeface="Arial" panose="020B0604020202020204" pitchFamily="34" charset="0"/>
-              <a:buChar char="•"/>
-            </a:pPr>
-            <a:r>
-              <a:rPr lang="en-US" dirty="0"/>
-              <a:t>Controllers contain methods</a:t>
-            </a:r>
           </a:p>
           <a:p>
             <a:pPr marL="342900" indent="-342900">
@@ -9202,7 +11476,7 @@
 </p:sld>
 </file>
 
-<file path=ppt/slides/slide8.xml><?xml version="1.0" encoding="utf-8"?>
+<file path=ppt/slides/slide6.xml><?xml version="1.0" encoding="utf-8"?>
 <p:sld xmlns:a="http://schemas.openxmlformats.org/drawingml/2006/main" xmlns:r="http://schemas.openxmlformats.org/officeDocument/2006/relationships" xmlns:p="http://schemas.openxmlformats.org/presentationml/2006/main">
   <p:cSld>
     <p:spTree>
@@ -9295,7 +11569,7 @@
 </p:sld>
 </file>
 
-<file path=ppt/slides/slide9.xml><?xml version="1.0" encoding="utf-8"?>
+<file path=ppt/slides/slide7.xml><?xml version="1.0" encoding="utf-8"?>
 <p:sld xmlns:a="http://schemas.openxmlformats.org/drawingml/2006/main" xmlns:r="http://schemas.openxmlformats.org/officeDocument/2006/relationships" xmlns:p="http://schemas.openxmlformats.org/presentationml/2006/main">
   <p:cSld>
     <p:spTree>
@@ -9662,6 +11936,230 @@
     <p:extLst>
       <p:ext uri="{BB962C8B-B14F-4D97-AF65-F5344CB8AC3E}">
         <p14:creationId xmlns:p14="http://schemas.microsoft.com/office/powerpoint/2010/main" val="3800037293"/>
+      </p:ext>
+    </p:extLst>
+  </p:cSld>
+  <p:clrMapOvr>
+    <a:masterClrMapping/>
+  </p:clrMapOvr>
+</p:sld>
+</file>
+
+<file path=ppt/slides/slide8.xml><?xml version="1.0" encoding="utf-8"?>
+<p:sld xmlns:a="http://schemas.openxmlformats.org/drawingml/2006/main" xmlns:r="http://schemas.openxmlformats.org/officeDocument/2006/relationships" xmlns:p="http://schemas.openxmlformats.org/presentationml/2006/main">
+  <p:cSld>
+    <p:spTree>
+      <p:nvGrpSpPr>
+        <p:cNvPr id="1" name=""/>
+        <p:cNvGrpSpPr/>
+        <p:nvPr/>
+      </p:nvGrpSpPr>
+      <p:grpSpPr>
+        <a:xfrm>
+          <a:off x="0" y="0"/>
+          <a:ext cx="0" cy="0"/>
+          <a:chOff x="0" y="0"/>
+          <a:chExt cx="0" cy="0"/>
+        </a:xfrm>
+      </p:grpSpPr>
+      <p:sp>
+        <p:nvSpPr>
+          <p:cNvPr id="2" name="Title 1"/>
+          <p:cNvSpPr>
+            <a:spLocks noGrp="1"/>
+          </p:cNvSpPr>
+          <p:nvPr>
+            <p:ph type="title"/>
+          </p:nvPr>
+        </p:nvSpPr>
+        <p:spPr/>
+        <p:txBody>
+          <a:bodyPr/>
+          <a:lstStyle/>
+          <a:p>
+            <a:r>
+              <a:rPr lang="en-US" dirty="0"/>
+              <a:t>ASP.NET vs ASP.NET Core</a:t>
+            </a:r>
+          </a:p>
+        </p:txBody>
+      </p:sp>
+      <p:pic>
+        <p:nvPicPr>
+          <p:cNvPr id="4" name="Picture 3"/>
+          <p:cNvPicPr>
+            <a:picLocks noChangeAspect="1"/>
+          </p:cNvPicPr>
+          <p:nvPr/>
+        </p:nvPicPr>
+        <p:blipFill>
+          <a:blip r:embed="rId3"/>
+          <a:stretch>
+            <a:fillRect/>
+          </a:stretch>
+        </p:blipFill>
+        <p:spPr>
+          <a:xfrm>
+            <a:off x="416615" y="1200064"/>
+            <a:ext cx="8307587" cy="2400386"/>
+          </a:xfrm>
+          <a:prstGeom prst="rect">
+            <a:avLst/>
+          </a:prstGeom>
+        </p:spPr>
+      </p:pic>
+    </p:spTree>
+    <p:extLst>
+      <p:ext uri="{BB962C8B-B14F-4D97-AF65-F5344CB8AC3E}">
+        <p14:creationId xmlns:p14="http://schemas.microsoft.com/office/powerpoint/2010/main" val="2466830981"/>
+      </p:ext>
+    </p:extLst>
+  </p:cSld>
+  <p:clrMapOvr>
+    <a:masterClrMapping/>
+  </p:clrMapOvr>
+</p:sld>
+</file>
+
+<file path=ppt/slides/slide9.xml><?xml version="1.0" encoding="utf-8"?>
+<p:sld xmlns:a="http://schemas.openxmlformats.org/drawingml/2006/main" xmlns:r="http://schemas.openxmlformats.org/officeDocument/2006/relationships" xmlns:p="http://schemas.openxmlformats.org/presentationml/2006/main">
+  <p:cSld>
+    <p:spTree>
+      <p:nvGrpSpPr>
+        <p:cNvPr id="1" name=""/>
+        <p:cNvGrpSpPr/>
+        <p:nvPr/>
+      </p:nvGrpSpPr>
+      <p:grpSpPr>
+        <a:xfrm>
+          <a:off x="0" y="0"/>
+          <a:ext cx="0" cy="0"/>
+          <a:chOff x="0" y="0"/>
+          <a:chExt cx="0" cy="0"/>
+        </a:xfrm>
+      </p:grpSpPr>
+      <p:sp>
+        <p:nvSpPr>
+          <p:cNvPr id="2" name="Title 1"/>
+          <p:cNvSpPr>
+            <a:spLocks noGrp="1"/>
+          </p:cNvSpPr>
+          <p:nvPr>
+            <p:ph type="title"/>
+          </p:nvPr>
+        </p:nvSpPr>
+        <p:spPr/>
+        <p:txBody>
+          <a:bodyPr/>
+          <a:lstStyle/>
+          <a:p>
+            <a:r>
+              <a:rPr lang="en-US" dirty="0" err="1"/>
+              <a:t>WebAPI</a:t>
+            </a:r>
+            <a:endParaRPr lang="en-US" dirty="0"/>
+          </a:p>
+        </p:txBody>
+      </p:sp>
+      <p:sp>
+        <p:nvSpPr>
+          <p:cNvPr id="3" name="Content Placeholder 2"/>
+          <p:cNvSpPr>
+            <a:spLocks noGrp="1"/>
+          </p:cNvSpPr>
+          <p:nvPr>
+            <p:ph idx="1"/>
+          </p:nvPr>
+        </p:nvSpPr>
+        <p:spPr/>
+        <p:txBody>
+          <a:bodyPr/>
+          <a:lstStyle/>
+          <a:p>
+            <a:pPr marL="342900" indent="-342900">
+              <a:buFont typeface="Arial" panose="020B0604020202020204" pitchFamily="34" charset="0"/>
+              <a:buChar char="•"/>
+            </a:pPr>
+            <a:r>
+              <a:rPr lang="en-US" dirty="0"/>
+              <a:t>There are a lot of similarities between ASP.NET and ASP.NET Core</a:t>
+            </a:r>
+          </a:p>
+          <a:p>
+            <a:pPr marL="342900" indent="-342900">
+              <a:buFont typeface="Arial" panose="020B0604020202020204" pitchFamily="34" charset="0"/>
+              <a:buChar char="•"/>
+            </a:pPr>
+            <a:endParaRPr lang="en-US" dirty="0"/>
+          </a:p>
+          <a:p>
+            <a:pPr marL="342900" indent="-342900">
+              <a:buFont typeface="Arial" panose="020B0604020202020204" pitchFamily="34" charset="0"/>
+              <a:buChar char="•"/>
+            </a:pPr>
+            <a:r>
+              <a:rPr lang="en-US" dirty="0"/>
+              <a:t>Similar to MVC:</a:t>
+            </a:r>
+          </a:p>
+          <a:p>
+            <a:pPr marL="573088" lvl="1" indent="-342900">
+              <a:buFont typeface="Arial" panose="020B0604020202020204" pitchFamily="34" charset="0"/>
+              <a:buChar char="•"/>
+            </a:pPr>
+            <a:r>
+              <a:rPr lang="en-US" sz="2000" dirty="0"/>
+              <a:t>Controllers: classes that inherit from a special base class</a:t>
+            </a:r>
+          </a:p>
+          <a:p>
+            <a:pPr marL="2857500" lvl="5" indent="-342900">
+              <a:buFont typeface="Arial" panose="020B0604020202020204" pitchFamily="34" charset="0"/>
+              <a:buChar char="•"/>
+            </a:pPr>
+            <a:endParaRPr lang="en-US" dirty="0"/>
+          </a:p>
+          <a:p>
+            <a:pPr marL="573088" lvl="1" indent="-342900">
+              <a:buFont typeface="Arial" panose="020B0604020202020204" pitchFamily="34" charset="0"/>
+              <a:buChar char="•"/>
+            </a:pPr>
+            <a:r>
+              <a:rPr lang="en-US" sz="2000" dirty="0"/>
+              <a:t>Methods: endpoints</a:t>
+            </a:r>
+          </a:p>
+          <a:p>
+            <a:pPr marL="573088" lvl="1" indent="-342900">
+              <a:buFont typeface="Arial" panose="020B0604020202020204" pitchFamily="34" charset="0"/>
+              <a:buChar char="•"/>
+            </a:pPr>
+            <a:endParaRPr lang="en-US" sz="2000" dirty="0"/>
+          </a:p>
+          <a:p>
+            <a:pPr marL="573088" lvl="1" indent="-342900">
+              <a:buFont typeface="Arial" panose="020B0604020202020204" pitchFamily="34" charset="0"/>
+              <a:buChar char="•"/>
+            </a:pPr>
+            <a:r>
+              <a:rPr lang="en-US" sz="2000" dirty="0"/>
+              <a:t>Optional </a:t>
+            </a:r>
+            <a:r>
+              <a:rPr lang="en-US" sz="2000" dirty="0" err="1"/>
+              <a:t>async</a:t>
+            </a:r>
+            <a:r>
+              <a:rPr lang="en-US" sz="2000" dirty="0"/>
+              <a:t>/await</a:t>
+            </a:r>
+          </a:p>
+        </p:txBody>
+      </p:sp>
+    </p:spTree>
+    <p:extLst>
+      <p:ext uri="{BB962C8B-B14F-4D97-AF65-F5344CB8AC3E}">
+        <p14:creationId xmlns:p14="http://schemas.microsoft.com/office/powerpoint/2010/main" val="1294541063"/>
       </p:ext>
     </p:extLst>
   </p:cSld>

</xml_diff>

<commit_message>
updated readme, created PDF snapshots of slides
</commit_message>
<xml_diff>
--- a/03/03.pptx
+++ b/03/03.pptx
@@ -287,7 +287,7 @@
           <a:p>
             <a:fld id="{B5389E1E-C654-E943-9883-792E99AD7287}" type="datetimeFigureOut">
               <a:rPr lang="en-US" smtClean="0"/>
-              <a:t>3/22/2017</a:t>
+              <a:t>3/27/2017</a:t>
             </a:fld>
             <a:endParaRPr lang="en-US"/>
           </a:p>
@@ -453,7 +453,7 @@
           <a:p>
             <a:fld id="{9920D99B-2862-464A-984E-65BFC5FC0BBC}" type="datetimeFigureOut">
               <a:rPr lang="en-US" smtClean="0"/>
-              <a:t>3/22/2017</a:t>
+              <a:t>3/27/2017</a:t>
             </a:fld>
             <a:endParaRPr lang="en-US"/>
           </a:p>
@@ -8021,8 +8021,12 @@
           <a:lstStyle/>
           <a:p>
             <a:r>
+              <a:rPr lang="en-US" sz="3600"/>
+              <a:t>Workshop 3 </a:t>
+            </a:r>
+            <a:r>
               <a:rPr lang="en-US" sz="3600" dirty="0"/>
-              <a:t>Workshop 4 – Building a RESTful API</a:t>
+              <a:t>– Building a RESTful API</a:t>
             </a:r>
           </a:p>
         </p:txBody>

</xml_diff>